<commit_message>
Loding Scene PPT Update
</commit_message>
<xml_diff>
--- a/기말과제.pptx
+++ b/기말과제.pptx
@@ -5,7 +5,7 @@
     <p:sldMasterId id="2147483660" r:id="rId1"/>
   </p:sldMasterIdLst>
   <p:notesMasterIdLst>
-    <p:notesMasterId r:id="rId22"/>
+    <p:notesMasterId r:id="rId29"/>
   </p:notesMasterIdLst>
   <p:sldIdLst>
     <p:sldId id="258" r:id="rId2"/>
@@ -26,8 +26,15 @@
     <p:sldId id="294" r:id="rId17"/>
     <p:sldId id="295" r:id="rId18"/>
     <p:sldId id="291" r:id="rId19"/>
-    <p:sldId id="274" r:id="rId20"/>
-    <p:sldId id="272" r:id="rId21"/>
+    <p:sldId id="296" r:id="rId20"/>
+    <p:sldId id="297" r:id="rId21"/>
+    <p:sldId id="298" r:id="rId22"/>
+    <p:sldId id="299" r:id="rId23"/>
+    <p:sldId id="300" r:id="rId24"/>
+    <p:sldId id="301" r:id="rId25"/>
+    <p:sldId id="302" r:id="rId26"/>
+    <p:sldId id="274" r:id="rId27"/>
+    <p:sldId id="272" r:id="rId28"/>
   </p:sldIdLst>
   <p:sldSz cx="9144000" cy="6858000" type="screen4x3"/>
   <p:notesSz cx="6858000" cy="9144000"/>
@@ -128,7 +135,7 @@
   </p:defaultTextStyle>
   <p:extLst>
     <p:ext uri="{EFAFB233-063F-42B5-8137-9DF3F51BA10A}">
-      <p15:sldGuideLst xmlns:p15="http://schemas.microsoft.com/office/powerpoint/2012/main">
+      <p15:sldGuideLst xmlns:p15="http://schemas.microsoft.com/office/powerpoint/2012/main" xmlns="">
         <p15:guide id="2" pos="2880" userDrawn="1">
           <p15:clr>
             <a:srgbClr val="A4A3A4"/>
@@ -252,7 +259,8 @@
           <a:p>
             <a:fld id="{74D30B1E-1C71-4203-B134-4CDC729AEC97}" type="datetimeFigureOut">
               <a:rPr lang="ko-KR" altLang="en-US" smtClean="0"/>
-              <a:t>2017-11-17</a:t>
+              <a:pPr/>
+              <a:t>2017-11-20</a:t>
             </a:fld>
             <a:endParaRPr lang="ko-KR" altLang="en-US"/>
           </a:p>
@@ -411,6 +419,7 @@
           <a:p>
             <a:fld id="{604FAB76-E660-4882-82F9-C93BDF736CDF}" type="slidenum">
               <a:rPr lang="ko-KR" altLang="en-US" smtClean="0"/>
+              <a:pPr/>
               <a:t>‹#›</a:t>
             </a:fld>
             <a:endParaRPr lang="ko-KR" altLang="en-US"/>
@@ -420,7 +429,7 @@
     </p:spTree>
     <p:extLst>
       <p:ext uri="{BB962C8B-B14F-4D97-AF65-F5344CB8AC3E}">
-        <p14:creationId xmlns:p14="http://schemas.microsoft.com/office/powerpoint/2010/main" val="273854862"/>
+        <p14:creationId xmlns:p14="http://schemas.microsoft.com/office/powerpoint/2010/main" xmlns="" val="273854862"/>
       </p:ext>
     </p:extLst>
   </p:cSld>
@@ -573,7 +582,7 @@
     </p:spTree>
     <p:extLst>
       <p:ext uri="{BB962C8B-B14F-4D97-AF65-F5344CB8AC3E}">
-        <p14:creationId xmlns:p14="http://schemas.microsoft.com/office/powerpoint/2010/main" val="1253975699"/>
+        <p14:creationId xmlns:p14="http://schemas.microsoft.com/office/powerpoint/2010/main" xmlns="" val="1253975699"/>
       </p:ext>
     </p:extLst>
   </p:cSld>
@@ -874,7 +883,7 @@
     </p:spTree>
     <p:extLst>
       <p:ext uri="{BB962C8B-B14F-4D97-AF65-F5344CB8AC3E}">
-        <p14:creationId xmlns:p14="http://schemas.microsoft.com/office/powerpoint/2010/main" val="3643967810"/>
+        <p14:creationId xmlns:p14="http://schemas.microsoft.com/office/powerpoint/2010/main" xmlns="" val="3643967810"/>
       </p:ext>
     </p:extLst>
   </p:cSld>
@@ -1225,12 +1234,6 @@
               </a:rPr>
               <a:t>FINAL PROJECT</a:t>
             </a:r>
-            <a:endParaRPr lang="en-US" altLang="ko-KR" sz="6600" b="1" dirty="0" smtClean="0">
-              <a:solidFill>
-                <a:srgbClr val="1CCAB9"/>
-              </a:solidFill>
-              <a:latin typeface="+mn-ea"/>
-            </a:endParaRPr>
           </a:p>
           <a:p>
             <a:pPr algn="r"/>
@@ -1306,35 +1309,26 @@
               </a:rPr>
               <a:t>김덕현</a:t>
             </a:r>
-            <a:endParaRPr lang="ko-KR" altLang="en-US" sz="1600" dirty="0" smtClean="0">
-              <a:solidFill>
-                <a:schemeClr val="tx1">
-                  <a:lumMod val="85000"/>
-                  <a:lumOff val="15000"/>
-                </a:schemeClr>
-              </a:solidFill>
-              <a:latin typeface="+mn-ea"/>
-            </a:endParaRPr>
           </a:p>
         </p:txBody>
       </p:sp>
     </p:spTree>
     <p:extLst>
       <p:ext uri="{BB962C8B-B14F-4D97-AF65-F5344CB8AC3E}">
-        <p14:creationId xmlns:p14="http://schemas.microsoft.com/office/powerpoint/2010/main" val="1872106186"/>
+        <p14:creationId xmlns:p14="http://schemas.microsoft.com/office/powerpoint/2010/main" xmlns="" val="1872106186"/>
       </p:ext>
     </p:extLst>
   </p:cSld>
   <p:clrMapOvr>
     <a:masterClrMapping/>
   </p:clrMapOvr>
-  <mc:AlternateContent xmlns:mc="http://schemas.openxmlformats.org/markup-compatibility/2006" xmlns:p14="http://schemas.microsoft.com/office/powerpoint/2010/main">
-    <mc:Choice Requires="p14">
+  <mc:AlternateContent xmlns:mc="http://schemas.openxmlformats.org/markup-compatibility/2006">
+    <mc:Choice xmlns:p14="http://schemas.microsoft.com/office/powerpoint/2010/main" xmlns="" Requires="p14">
       <p:transition spd="med" p14:dur="700">
         <p:fade/>
       </p:transition>
     </mc:Choice>
-    <mc:Fallback xmlns="">
+    <mc:Fallback>
       <p:transition spd="med">
         <p:fade/>
       </p:transition>
@@ -1416,7 +1410,7 @@
           <p:nvPr/>
         </p:nvPicPr>
         <p:blipFill>
-          <a:blip r:embed="rId2"/>
+          <a:blip r:embed="rId2" cstate="print"/>
           <a:stretch>
             <a:fillRect/>
           </a:stretch>
@@ -1549,7 +1543,7 @@
           <p:nvPr/>
         </p:nvPicPr>
         <p:blipFill>
-          <a:blip r:embed="rId3"/>
+          <a:blip r:embed="rId3" cstate="print"/>
           <a:stretch>
             <a:fillRect/>
           </a:stretch>
@@ -1681,7 +1675,7 @@
           <p:nvPr/>
         </p:nvPicPr>
         <p:blipFill>
-          <a:blip r:embed="rId4"/>
+          <a:blip r:embed="rId4" cstate="print"/>
           <a:stretch>
             <a:fillRect/>
           </a:stretch>
@@ -1796,20 +1790,20 @@
     </p:spTree>
     <p:extLst>
       <p:ext uri="{BB962C8B-B14F-4D97-AF65-F5344CB8AC3E}">
-        <p14:creationId xmlns:p14="http://schemas.microsoft.com/office/powerpoint/2010/main" val="4060730173"/>
+        <p14:creationId xmlns:p14="http://schemas.microsoft.com/office/powerpoint/2010/main" xmlns="" val="4060730173"/>
       </p:ext>
     </p:extLst>
   </p:cSld>
   <p:clrMapOvr>
     <a:masterClrMapping/>
   </p:clrMapOvr>
-  <mc:AlternateContent xmlns:mc="http://schemas.openxmlformats.org/markup-compatibility/2006" xmlns:p14="http://schemas.microsoft.com/office/powerpoint/2010/main">
-    <mc:Choice Requires="p14">
+  <mc:AlternateContent xmlns:mc="http://schemas.openxmlformats.org/markup-compatibility/2006">
+    <mc:Choice xmlns:p14="http://schemas.microsoft.com/office/powerpoint/2010/main" xmlns="" Requires="p14">
       <p:transition spd="med" p14:dur="700">
         <p:fade/>
       </p:transition>
     </mc:Choice>
-    <mc:Fallback xmlns="">
+    <mc:Fallback>
       <p:transition spd="med">
         <p:fade/>
       </p:transition>
@@ -1891,7 +1885,7 @@
           <p:nvPr/>
         </p:nvPicPr>
         <p:blipFill>
-          <a:blip r:embed="rId2"/>
+          <a:blip r:embed="rId2" cstate="print"/>
           <a:stretch>
             <a:fillRect/>
           </a:stretch>
@@ -2015,7 +2009,7 @@
           <p:nvPr/>
         </p:nvPicPr>
         <p:blipFill>
-          <a:blip r:embed="rId3"/>
+          <a:blip r:embed="rId3" cstate="print"/>
           <a:stretch>
             <a:fillRect/>
           </a:stretch>
@@ -2147,20 +2141,20 @@
     </p:spTree>
     <p:extLst>
       <p:ext uri="{BB962C8B-B14F-4D97-AF65-F5344CB8AC3E}">
-        <p14:creationId xmlns:p14="http://schemas.microsoft.com/office/powerpoint/2010/main" val="1265935966"/>
+        <p14:creationId xmlns:p14="http://schemas.microsoft.com/office/powerpoint/2010/main" xmlns="" val="1265935966"/>
       </p:ext>
     </p:extLst>
   </p:cSld>
   <p:clrMapOvr>
     <a:masterClrMapping/>
   </p:clrMapOvr>
-  <mc:AlternateContent xmlns:mc="http://schemas.openxmlformats.org/markup-compatibility/2006" xmlns:p14="http://schemas.microsoft.com/office/powerpoint/2010/main">
-    <mc:Choice Requires="p14">
+  <mc:AlternateContent xmlns:mc="http://schemas.openxmlformats.org/markup-compatibility/2006">
+    <mc:Choice xmlns:p14="http://schemas.microsoft.com/office/powerpoint/2010/main" xmlns="" Requires="p14">
       <p:transition spd="med" p14:dur="700">
         <p:fade/>
       </p:transition>
     </mc:Choice>
-    <mc:Fallback xmlns="">
+    <mc:Fallback>
       <p:transition spd="med">
         <p:fade/>
       </p:transition>
@@ -2242,7 +2236,7 @@
           <p:nvPr/>
         </p:nvPicPr>
         <p:blipFill>
-          <a:blip r:embed="rId2"/>
+          <a:blip r:embed="rId2" cstate="print"/>
           <a:stretch>
             <a:fillRect/>
           </a:stretch>
@@ -2395,7 +2389,7 @@
           <p:nvPr/>
         </p:nvPicPr>
         <p:blipFill>
-          <a:blip r:embed="rId3"/>
+          <a:blip r:embed="rId3" cstate="print"/>
           <a:stretch>
             <a:fillRect/>
           </a:stretch>
@@ -2489,7 +2483,7 @@
           <p:nvPr/>
         </p:nvPicPr>
         <p:blipFill>
-          <a:blip r:embed="rId4"/>
+          <a:blip r:embed="rId4" cstate="print"/>
           <a:stretch>
             <a:fillRect/>
           </a:stretch>
@@ -2558,20 +2552,20 @@
     </p:spTree>
     <p:extLst>
       <p:ext uri="{BB962C8B-B14F-4D97-AF65-F5344CB8AC3E}">
-        <p14:creationId xmlns:p14="http://schemas.microsoft.com/office/powerpoint/2010/main" val="1498761617"/>
+        <p14:creationId xmlns:p14="http://schemas.microsoft.com/office/powerpoint/2010/main" xmlns="" val="1498761617"/>
       </p:ext>
     </p:extLst>
   </p:cSld>
   <p:clrMapOvr>
     <a:masterClrMapping/>
   </p:clrMapOvr>
-  <mc:AlternateContent xmlns:mc="http://schemas.openxmlformats.org/markup-compatibility/2006" xmlns:p14="http://schemas.microsoft.com/office/powerpoint/2010/main">
-    <mc:Choice Requires="p14">
+  <mc:AlternateContent xmlns:mc="http://schemas.openxmlformats.org/markup-compatibility/2006">
+    <mc:Choice xmlns:p14="http://schemas.microsoft.com/office/powerpoint/2010/main" xmlns="" Requires="p14">
       <p:transition spd="med" p14:dur="700">
         <p:fade/>
       </p:transition>
     </mc:Choice>
-    <mc:Fallback xmlns="">
+    <mc:Fallback>
       <p:transition spd="med">
         <p:fade/>
       </p:transition>
@@ -2653,7 +2647,7 @@
           <p:nvPr/>
         </p:nvPicPr>
         <p:blipFill>
-          <a:blip r:embed="rId2"/>
+          <a:blip r:embed="rId2" cstate="print"/>
           <a:stretch>
             <a:fillRect/>
           </a:stretch>
@@ -2747,7 +2741,7 @@
           <p:nvPr/>
         </p:nvPicPr>
         <p:blipFill>
-          <a:blip r:embed="rId3"/>
+          <a:blip r:embed="rId3" cstate="print"/>
           <a:stretch>
             <a:fillRect/>
           </a:stretch>
@@ -3209,20 +3203,20 @@
     </p:spTree>
     <p:extLst>
       <p:ext uri="{BB962C8B-B14F-4D97-AF65-F5344CB8AC3E}">
-        <p14:creationId xmlns:p14="http://schemas.microsoft.com/office/powerpoint/2010/main" val="960751349"/>
+        <p14:creationId xmlns:p14="http://schemas.microsoft.com/office/powerpoint/2010/main" xmlns="" val="960751349"/>
       </p:ext>
     </p:extLst>
   </p:cSld>
   <p:clrMapOvr>
     <a:masterClrMapping/>
   </p:clrMapOvr>
-  <mc:AlternateContent xmlns:mc="http://schemas.openxmlformats.org/markup-compatibility/2006" xmlns:p14="http://schemas.microsoft.com/office/powerpoint/2010/main">
-    <mc:Choice Requires="p14">
+  <mc:AlternateContent xmlns:mc="http://schemas.openxmlformats.org/markup-compatibility/2006">
+    <mc:Choice xmlns:p14="http://schemas.microsoft.com/office/powerpoint/2010/main" xmlns="" Requires="p14">
       <p:transition spd="med" p14:dur="700">
         <p:fade/>
       </p:transition>
     </mc:Choice>
-    <mc:Fallback xmlns="">
+    <mc:Fallback>
       <p:transition spd="med">
         <p:fade/>
       </p:transition>
@@ -3304,7 +3298,7 @@
           <p:nvPr/>
         </p:nvPicPr>
         <p:blipFill>
-          <a:blip r:embed="rId2"/>
+          <a:blip r:embed="rId2" cstate="print"/>
           <a:stretch>
             <a:fillRect/>
           </a:stretch>
@@ -3398,7 +3392,7 @@
           <p:nvPr/>
         </p:nvPicPr>
         <p:blipFill>
-          <a:blip r:embed="rId3"/>
+          <a:blip r:embed="rId3" cstate="print"/>
           <a:stretch>
             <a:fillRect/>
           </a:stretch>
@@ -3767,20 +3761,20 @@
     </p:spTree>
     <p:extLst>
       <p:ext uri="{BB962C8B-B14F-4D97-AF65-F5344CB8AC3E}">
-        <p14:creationId xmlns:p14="http://schemas.microsoft.com/office/powerpoint/2010/main" val="1933012466"/>
+        <p14:creationId xmlns:p14="http://schemas.microsoft.com/office/powerpoint/2010/main" xmlns="" val="1933012466"/>
       </p:ext>
     </p:extLst>
   </p:cSld>
   <p:clrMapOvr>
     <a:masterClrMapping/>
   </p:clrMapOvr>
-  <mc:AlternateContent xmlns:mc="http://schemas.openxmlformats.org/markup-compatibility/2006" xmlns:p14="http://schemas.microsoft.com/office/powerpoint/2010/main">
-    <mc:Choice Requires="p14">
+  <mc:AlternateContent xmlns:mc="http://schemas.openxmlformats.org/markup-compatibility/2006">
+    <mc:Choice xmlns:p14="http://schemas.microsoft.com/office/powerpoint/2010/main" xmlns="" Requires="p14">
       <p:transition spd="med" p14:dur="700">
         <p:fade/>
       </p:transition>
     </mc:Choice>
-    <mc:Fallback xmlns="">
+    <mc:Fallback>
       <p:transition spd="med">
         <p:fade/>
       </p:transition>
@@ -3862,7 +3856,7 @@
           <p:nvPr/>
         </p:nvPicPr>
         <p:blipFill>
-          <a:blip r:embed="rId2"/>
+          <a:blip r:embed="rId2" cstate="print"/>
           <a:stretch>
             <a:fillRect/>
           </a:stretch>
@@ -3983,7 +3977,7 @@
           <p:nvPr/>
         </p:nvPicPr>
         <p:blipFill>
-          <a:blip r:embed="rId3"/>
+          <a:blip r:embed="rId3" cstate="print"/>
           <a:stretch>
             <a:fillRect/>
           </a:stretch>
@@ -4064,20 +4058,20 @@
     </p:spTree>
     <p:extLst>
       <p:ext uri="{BB962C8B-B14F-4D97-AF65-F5344CB8AC3E}">
-        <p14:creationId xmlns:p14="http://schemas.microsoft.com/office/powerpoint/2010/main" val="3192667020"/>
+        <p14:creationId xmlns:p14="http://schemas.microsoft.com/office/powerpoint/2010/main" xmlns="" val="3192667020"/>
       </p:ext>
     </p:extLst>
   </p:cSld>
   <p:clrMapOvr>
     <a:masterClrMapping/>
   </p:clrMapOvr>
-  <mc:AlternateContent xmlns:mc="http://schemas.openxmlformats.org/markup-compatibility/2006" xmlns:p14="http://schemas.microsoft.com/office/powerpoint/2010/main">
-    <mc:Choice Requires="p14">
+  <mc:AlternateContent xmlns:mc="http://schemas.openxmlformats.org/markup-compatibility/2006">
+    <mc:Choice xmlns:p14="http://schemas.microsoft.com/office/powerpoint/2010/main" xmlns="" Requires="p14">
       <p:transition spd="med" p14:dur="700">
         <p:fade/>
       </p:transition>
     </mc:Choice>
-    <mc:Fallback xmlns="">
+    <mc:Fallback>
       <p:transition spd="med">
         <p:fade/>
       </p:transition>
@@ -4159,7 +4153,7 @@
           <p:nvPr/>
         </p:nvPicPr>
         <p:blipFill>
-          <a:blip r:embed="rId2"/>
+          <a:blip r:embed="rId2" cstate="print"/>
           <a:stretch>
             <a:fillRect/>
           </a:stretch>
@@ -4259,20 +4253,20 @@
     </p:spTree>
     <p:extLst>
       <p:ext uri="{BB962C8B-B14F-4D97-AF65-F5344CB8AC3E}">
-        <p14:creationId xmlns:p14="http://schemas.microsoft.com/office/powerpoint/2010/main" val="4265309106"/>
+        <p14:creationId xmlns:p14="http://schemas.microsoft.com/office/powerpoint/2010/main" xmlns="" val="4265309106"/>
       </p:ext>
     </p:extLst>
   </p:cSld>
   <p:clrMapOvr>
     <a:masterClrMapping/>
   </p:clrMapOvr>
-  <mc:AlternateContent xmlns:mc="http://schemas.openxmlformats.org/markup-compatibility/2006" xmlns:p14="http://schemas.microsoft.com/office/powerpoint/2010/main">
-    <mc:Choice Requires="p14">
+  <mc:AlternateContent xmlns:mc="http://schemas.openxmlformats.org/markup-compatibility/2006">
+    <mc:Choice xmlns:p14="http://schemas.microsoft.com/office/powerpoint/2010/main" xmlns="" Requires="p14">
       <p:transition spd="med" p14:dur="700">
         <p:fade/>
       </p:transition>
     </mc:Choice>
-    <mc:Fallback xmlns="">
+    <mc:Fallback>
       <p:transition spd="med">
         <p:fade/>
       </p:transition>
@@ -4334,7 +4328,7 @@
                 </a:solidFill>
                 <a:latin typeface="+mn-ea"/>
               </a:rPr>
-              <a:t>Loading Scene</a:t>
+              <a:t>SceneManager</a:t>
             </a:r>
             <a:endParaRPr lang="en-US" altLang="ko-KR" sz="3400" b="1" dirty="0">
               <a:solidFill>
@@ -4345,23 +4339,305 @@
           </a:p>
         </p:txBody>
       </p:sp>
+      <p:pic>
+        <p:nvPicPr>
+          <p:cNvPr id="1026" name="Picture 2"/>
+          <p:cNvPicPr>
+            <a:picLocks noChangeAspect="1" noChangeArrowheads="1"/>
+          </p:cNvPicPr>
+          <p:nvPr/>
+        </p:nvPicPr>
+        <p:blipFill>
+          <a:blip r:embed="rId2" cstate="print"/>
+          <a:srcRect/>
+          <a:stretch>
+            <a:fillRect/>
+          </a:stretch>
+        </p:blipFill>
+        <p:spPr bwMode="auto">
+          <a:xfrm>
+            <a:off x="791580" y="980728"/>
+            <a:ext cx="2006600" cy="5162550"/>
+          </a:xfrm>
+          <a:prstGeom prst="rect">
+            <a:avLst/>
+          </a:prstGeom>
+          <a:noFill/>
+          <a:ln w="9525">
+            <a:noFill/>
+            <a:miter lim="800000"/>
+            <a:headEnd/>
+            <a:tailEnd/>
+          </a:ln>
+        </p:spPr>
+      </p:pic>
+      <p:sp>
+        <p:nvSpPr>
+          <p:cNvPr id="5" name="모서리가 둥근 직사각형 4"/>
+          <p:cNvSpPr/>
+          <p:nvPr/>
+        </p:nvSpPr>
+        <p:spPr>
+          <a:xfrm>
+            <a:off x="1043608" y="1952836"/>
+            <a:ext cx="504056" cy="255662"/>
+          </a:xfrm>
+          <a:prstGeom prst="roundRect">
+            <a:avLst/>
+          </a:prstGeom>
+          <a:noFill/>
+          <a:ln>
+            <a:solidFill>
+              <a:srgbClr val="FF0000"/>
+            </a:solidFill>
+          </a:ln>
+        </p:spPr>
+        <p:style>
+          <a:lnRef idx="2">
+            <a:schemeClr val="accent1">
+              <a:shade val="50000"/>
+            </a:schemeClr>
+          </a:lnRef>
+          <a:fillRef idx="1">
+            <a:schemeClr val="accent1"/>
+          </a:fillRef>
+          <a:effectRef idx="0">
+            <a:schemeClr val="accent1"/>
+          </a:effectRef>
+          <a:fontRef idx="minor">
+            <a:schemeClr val="lt1"/>
+          </a:fontRef>
+        </p:style>
+        <p:txBody>
+          <a:bodyPr rot="0" spcFirstLastPara="0" vertOverflow="overflow" horzOverflow="overflow" vert="horz" wrap="square" lIns="91440" tIns="45720" rIns="91440" bIns="45720" numCol="1" spcCol="0" rtlCol="0" fromWordArt="0" anchor="ctr" anchorCtr="0" forceAA="0" compatLnSpc="1">
+            <a:prstTxWarp prst="textNoShape">
+              <a:avLst/>
+            </a:prstTxWarp>
+            <a:noAutofit/>
+          </a:bodyPr>
+          <a:lstStyle/>
+          <a:p>
+            <a:pPr algn="ctr"/>
+            <a:endParaRPr lang="ko-KR" altLang="en-US"/>
+          </a:p>
+        </p:txBody>
+      </p:sp>
+      <p:sp>
+        <p:nvSpPr>
+          <p:cNvPr id="6" name="TextBox 5"/>
+          <p:cNvSpPr txBox="1"/>
+          <p:nvPr/>
+        </p:nvSpPr>
+        <p:spPr>
+          <a:xfrm>
+            <a:off x="2987824" y="980728"/>
+            <a:ext cx="4006994" cy="276999"/>
+          </a:xfrm>
+          <a:prstGeom prst="rect">
+            <a:avLst/>
+          </a:prstGeom>
+          <a:noFill/>
+        </p:spPr>
+        <p:txBody>
+          <a:bodyPr wrap="none" rtlCol="0">
+            <a:spAutoFit/>
+          </a:bodyPr>
+          <a:lstStyle/>
+          <a:p>
+            <a:r>
+              <a:rPr lang="en-US" altLang="ko-KR" sz="1200" dirty="0" smtClean="0">
+                <a:latin typeface="+mj-lt"/>
+              </a:rPr>
+              <a:t>1. Project - Create – Scene</a:t>
+            </a:r>
+            <a:r>
+              <a:rPr lang="ko-KR" altLang="en-US" sz="1200" dirty="0" smtClean="0">
+                <a:latin typeface="+mj-lt"/>
+              </a:rPr>
+              <a:t>으로 새 </a:t>
+            </a:r>
+            <a:r>
+              <a:rPr lang="en-US" altLang="ko-KR" sz="1200" dirty="0" smtClean="0">
+                <a:latin typeface="+mj-lt"/>
+              </a:rPr>
+              <a:t>Scene</a:t>
+            </a:r>
+            <a:r>
+              <a:rPr lang="ko-KR" altLang="en-US" sz="1200" dirty="0" smtClean="0">
+                <a:latin typeface="+mj-lt"/>
+              </a:rPr>
+              <a:t>을 추가합니다</a:t>
+            </a:r>
+            <a:r>
+              <a:rPr lang="en-US" altLang="ko-KR" sz="1200" dirty="0" smtClean="0">
+                <a:latin typeface="+mj-lt"/>
+              </a:rPr>
+              <a:t>.</a:t>
+            </a:r>
+            <a:endParaRPr lang="ko-KR" altLang="en-US" sz="1200" dirty="0" smtClean="0">
+              <a:latin typeface="+mj-lt"/>
+            </a:endParaRPr>
+          </a:p>
+        </p:txBody>
+      </p:sp>
+      <p:pic>
+        <p:nvPicPr>
+          <p:cNvPr id="1027" name="Picture 3"/>
+          <p:cNvPicPr>
+            <a:picLocks noChangeAspect="1" noChangeArrowheads="1"/>
+          </p:cNvPicPr>
+          <p:nvPr/>
+        </p:nvPicPr>
+        <p:blipFill>
+          <a:blip r:embed="rId3" cstate="print"/>
+          <a:srcRect/>
+          <a:stretch>
+            <a:fillRect/>
+          </a:stretch>
+        </p:blipFill>
+        <p:spPr bwMode="auto">
+          <a:xfrm>
+            <a:off x="4391980" y="2744924"/>
+            <a:ext cx="752475" cy="1095375"/>
+          </a:xfrm>
+          <a:prstGeom prst="rect">
+            <a:avLst/>
+          </a:prstGeom>
+          <a:noFill/>
+          <a:ln w="9525">
+            <a:noFill/>
+            <a:miter lim="800000"/>
+            <a:headEnd/>
+            <a:tailEnd/>
+          </a:ln>
+        </p:spPr>
+      </p:pic>
+      <p:sp>
+        <p:nvSpPr>
+          <p:cNvPr id="7" name="TextBox 6"/>
+          <p:cNvSpPr txBox="1"/>
+          <p:nvPr/>
+        </p:nvSpPr>
+        <p:spPr>
+          <a:xfrm>
+            <a:off x="5400092" y="2744924"/>
+            <a:ext cx="3204356" cy="276999"/>
+          </a:xfrm>
+          <a:prstGeom prst="rect">
+            <a:avLst/>
+          </a:prstGeom>
+          <a:noFill/>
+        </p:spPr>
+        <p:txBody>
+          <a:bodyPr wrap="square" rtlCol="0">
+            <a:spAutoFit/>
+          </a:bodyPr>
+          <a:lstStyle/>
+          <a:p>
+            <a:r>
+              <a:rPr lang="en-US" altLang="ko-KR" sz="1200" dirty="0" smtClean="0">
+                <a:latin typeface="+mj-lt"/>
+              </a:rPr>
+              <a:t>2. Scene</a:t>
+            </a:r>
+            <a:r>
+              <a:rPr lang="ko-KR" altLang="en-US" sz="1200" dirty="0" smtClean="0">
+                <a:latin typeface="+mj-lt"/>
+              </a:rPr>
+              <a:t>의 이름은 </a:t>
+            </a:r>
+            <a:r>
+              <a:rPr lang="en-US" altLang="ko-KR" sz="1200" dirty="0" smtClean="0">
+                <a:latin typeface="+mj-lt"/>
+              </a:rPr>
+              <a:t>Main</a:t>
+            </a:r>
+            <a:r>
+              <a:rPr lang="ko-KR" altLang="en-US" sz="1200" dirty="0" smtClean="0">
+                <a:latin typeface="+mj-lt"/>
+              </a:rPr>
+              <a:t>으로 해줍니다</a:t>
+            </a:r>
+            <a:r>
+              <a:rPr lang="en-US" altLang="ko-KR" sz="1200" dirty="0" smtClean="0">
+                <a:latin typeface="+mj-lt"/>
+              </a:rPr>
+              <a:t>.</a:t>
+            </a:r>
+            <a:endParaRPr lang="ko-KR" altLang="en-US" sz="1200" dirty="0" smtClean="0">
+              <a:latin typeface="+mj-lt"/>
+            </a:endParaRPr>
+          </a:p>
+        </p:txBody>
+      </p:sp>
+      <p:sp>
+        <p:nvSpPr>
+          <p:cNvPr id="10" name="모서리가 둥근 직사각형 9"/>
+          <p:cNvSpPr/>
+          <p:nvPr/>
+        </p:nvSpPr>
+        <p:spPr>
+          <a:xfrm>
+            <a:off x="4535996" y="3609020"/>
+            <a:ext cx="504056" cy="255662"/>
+          </a:xfrm>
+          <a:prstGeom prst="roundRect">
+            <a:avLst/>
+          </a:prstGeom>
+          <a:noFill/>
+          <a:ln>
+            <a:solidFill>
+              <a:srgbClr val="FF0000"/>
+            </a:solidFill>
+          </a:ln>
+        </p:spPr>
+        <p:style>
+          <a:lnRef idx="2">
+            <a:schemeClr val="accent1">
+              <a:shade val="50000"/>
+            </a:schemeClr>
+          </a:lnRef>
+          <a:fillRef idx="1">
+            <a:schemeClr val="accent1"/>
+          </a:fillRef>
+          <a:effectRef idx="0">
+            <a:schemeClr val="accent1"/>
+          </a:effectRef>
+          <a:fontRef idx="minor">
+            <a:schemeClr val="lt1"/>
+          </a:fontRef>
+        </p:style>
+        <p:txBody>
+          <a:bodyPr rot="0" spcFirstLastPara="0" vertOverflow="overflow" horzOverflow="overflow" vert="horz" wrap="square" lIns="91440" tIns="45720" rIns="91440" bIns="45720" numCol="1" spcCol="0" rtlCol="0" fromWordArt="0" anchor="ctr" anchorCtr="0" forceAA="0" compatLnSpc="1">
+            <a:prstTxWarp prst="textNoShape">
+              <a:avLst/>
+            </a:prstTxWarp>
+            <a:noAutofit/>
+          </a:bodyPr>
+          <a:lstStyle/>
+          <a:p>
+            <a:pPr algn="ctr"/>
+            <a:endParaRPr lang="ko-KR" altLang="en-US"/>
+          </a:p>
+        </p:txBody>
+      </p:sp>
     </p:spTree>
     <p:extLst>
       <p:ext uri="{BB962C8B-B14F-4D97-AF65-F5344CB8AC3E}">
-        <p14:creationId xmlns:p14="http://schemas.microsoft.com/office/powerpoint/2010/main" val="829825052"/>
+        <p14:creationId xmlns:p14="http://schemas.microsoft.com/office/powerpoint/2010/main" xmlns="" val="829825052"/>
       </p:ext>
     </p:extLst>
   </p:cSld>
   <p:clrMapOvr>
     <a:masterClrMapping/>
   </p:clrMapOvr>
-  <mc:AlternateContent xmlns:mc="http://schemas.openxmlformats.org/markup-compatibility/2006" xmlns:p14="http://schemas.microsoft.com/office/powerpoint/2010/main">
-    <mc:Choice Requires="p14">
+  <mc:AlternateContent xmlns:mc="http://schemas.openxmlformats.org/markup-compatibility/2006">
+    <mc:Choice xmlns:p14="http://schemas.microsoft.com/office/powerpoint/2010/main" xmlns="" Requires="p14">
       <p:transition spd="med" p14:dur="700">
         <p:fade/>
       </p:transition>
     </mc:Choice>
-    <mc:Fallback xmlns="">
+    <mc:Fallback>
       <p:transition spd="med">
         <p:fade/>
       </p:transition>
@@ -4423,34 +4699,377 @@
                 </a:solidFill>
                 <a:latin typeface="+mn-ea"/>
               </a:rPr>
-              <a:t>Loading Scene</a:t>
-            </a:r>
-            <a:endParaRPr lang="en-US" altLang="ko-KR" sz="3400" b="1" dirty="0">
-              <a:solidFill>
-                <a:srgbClr val="1CCAB9"/>
-              </a:solidFill>
-              <a:latin typeface="+mn-ea"/>
+              <a:t>Scene Manager</a:t>
+            </a:r>
+          </a:p>
+        </p:txBody>
+      </p:sp>
+      <p:pic>
+        <p:nvPicPr>
+          <p:cNvPr id="2050" name="Picture 2"/>
+          <p:cNvPicPr>
+            <a:picLocks noChangeAspect="1" noChangeArrowheads="1"/>
+          </p:cNvPicPr>
+          <p:nvPr/>
+        </p:nvPicPr>
+        <p:blipFill>
+          <a:blip r:embed="rId2" cstate="print"/>
+          <a:srcRect/>
+          <a:stretch>
+            <a:fillRect/>
+          </a:stretch>
+        </p:blipFill>
+        <p:spPr bwMode="auto">
+          <a:xfrm>
+            <a:off x="323528" y="1088740"/>
+            <a:ext cx="4238625" cy="3581400"/>
+          </a:xfrm>
+          <a:prstGeom prst="rect">
+            <a:avLst/>
+          </a:prstGeom>
+          <a:noFill/>
+          <a:ln w="9525">
+            <a:noFill/>
+            <a:miter lim="800000"/>
+            <a:headEnd/>
+            <a:tailEnd/>
+          </a:ln>
+        </p:spPr>
+      </p:pic>
+      <p:sp>
+        <p:nvSpPr>
+          <p:cNvPr id="5" name="모서리가 둥근 직사각형 4"/>
+          <p:cNvSpPr/>
+          <p:nvPr/>
+        </p:nvSpPr>
+        <p:spPr>
+          <a:xfrm>
+            <a:off x="611560" y="3609020"/>
+            <a:ext cx="504056" cy="255662"/>
+          </a:xfrm>
+          <a:prstGeom prst="roundRect">
+            <a:avLst/>
+          </a:prstGeom>
+          <a:noFill/>
+          <a:ln>
+            <a:solidFill>
+              <a:srgbClr val="FF0000"/>
+            </a:solidFill>
+          </a:ln>
+        </p:spPr>
+        <p:style>
+          <a:lnRef idx="2">
+            <a:schemeClr val="accent1">
+              <a:shade val="50000"/>
+            </a:schemeClr>
+          </a:lnRef>
+          <a:fillRef idx="1">
+            <a:schemeClr val="accent1"/>
+          </a:fillRef>
+          <a:effectRef idx="0">
+            <a:schemeClr val="accent1"/>
+          </a:effectRef>
+          <a:fontRef idx="minor">
+            <a:schemeClr val="lt1"/>
+          </a:fontRef>
+        </p:style>
+        <p:txBody>
+          <a:bodyPr rot="0" spcFirstLastPara="0" vertOverflow="overflow" horzOverflow="overflow" vert="horz" wrap="square" lIns="91440" tIns="45720" rIns="91440" bIns="45720" numCol="1" spcCol="0" rtlCol="0" fromWordArt="0" anchor="ctr" anchorCtr="0" forceAA="0" compatLnSpc="1">
+            <a:prstTxWarp prst="textNoShape">
+              <a:avLst/>
+            </a:prstTxWarp>
+            <a:noAutofit/>
+          </a:bodyPr>
+          <a:lstStyle/>
+          <a:p>
+            <a:pPr algn="ctr"/>
+            <a:endParaRPr lang="ko-KR" altLang="en-US"/>
+          </a:p>
+        </p:txBody>
+      </p:sp>
+      <p:sp>
+        <p:nvSpPr>
+          <p:cNvPr id="6" name="TextBox 5"/>
+          <p:cNvSpPr txBox="1"/>
+          <p:nvPr/>
+        </p:nvSpPr>
+        <p:spPr>
+          <a:xfrm>
+            <a:off x="4680013" y="1088740"/>
+            <a:ext cx="4320480" cy="461665"/>
+          </a:xfrm>
+          <a:prstGeom prst="rect">
+            <a:avLst/>
+          </a:prstGeom>
+          <a:noFill/>
+        </p:spPr>
+        <p:txBody>
+          <a:bodyPr wrap="square" rtlCol="0">
+            <a:spAutoFit/>
+          </a:bodyPr>
+          <a:lstStyle/>
+          <a:p>
+            <a:pPr marL="228600" indent="-228600">
+              <a:buAutoNum type="arabicPeriod"/>
+            </a:pPr>
+            <a:r>
+              <a:rPr lang="en-US" altLang="ko-KR" sz="1200" dirty="0" smtClean="0">
+                <a:latin typeface="+mj-lt"/>
+              </a:rPr>
+              <a:t>Loding Scene</a:t>
+            </a:r>
+            <a:r>
+              <a:rPr lang="ko-KR" altLang="en-US" sz="1200" dirty="0" smtClean="0">
+                <a:latin typeface="+mj-lt"/>
+              </a:rPr>
+              <a:t>으로 돌아와서 </a:t>
+            </a:r>
+            <a:r>
+              <a:rPr lang="en-US" altLang="ko-KR" sz="1200" dirty="0" smtClean="0">
+                <a:latin typeface="+mj-lt"/>
+              </a:rPr>
+              <a:t>Hierarchy – Create -  UI – Button</a:t>
+            </a:r>
+            <a:r>
+              <a:rPr lang="ko-KR" altLang="en-US" sz="1200" dirty="0" smtClean="0">
+                <a:latin typeface="+mj-lt"/>
+              </a:rPr>
+              <a:t>으로 새 </a:t>
+            </a:r>
+            <a:r>
+              <a:rPr lang="en-US" altLang="ko-KR" sz="1200" dirty="0" smtClean="0">
+                <a:latin typeface="+mj-lt"/>
+              </a:rPr>
+              <a:t>Button</a:t>
+            </a:r>
+            <a:r>
+              <a:rPr lang="ko-KR" altLang="en-US" sz="1200" dirty="0" smtClean="0">
+                <a:latin typeface="+mj-lt"/>
+              </a:rPr>
+              <a:t>을 만들어줍니다</a:t>
+            </a:r>
+            <a:r>
+              <a:rPr lang="en-US" altLang="ko-KR" sz="1200" dirty="0" smtClean="0">
+                <a:latin typeface="+mj-lt"/>
+              </a:rPr>
+              <a:t>.</a:t>
+            </a:r>
+            <a:endParaRPr lang="ko-KR" altLang="en-US" sz="1200" dirty="0" smtClean="0">
+              <a:latin typeface="+mj-lt"/>
             </a:endParaRPr>
+          </a:p>
+        </p:txBody>
+      </p:sp>
+      <p:sp>
+        <p:nvSpPr>
+          <p:cNvPr id="7" name="모서리가 둥근 직사각형 6"/>
+          <p:cNvSpPr/>
+          <p:nvPr/>
+        </p:nvSpPr>
+        <p:spPr>
+          <a:xfrm>
+            <a:off x="2987824" y="4365104"/>
+            <a:ext cx="504056" cy="255662"/>
+          </a:xfrm>
+          <a:prstGeom prst="roundRect">
+            <a:avLst/>
+          </a:prstGeom>
+          <a:noFill/>
+          <a:ln>
+            <a:solidFill>
+              <a:srgbClr val="FF0000"/>
+            </a:solidFill>
+          </a:ln>
+        </p:spPr>
+        <p:style>
+          <a:lnRef idx="2">
+            <a:schemeClr val="accent1">
+              <a:shade val="50000"/>
+            </a:schemeClr>
+          </a:lnRef>
+          <a:fillRef idx="1">
+            <a:schemeClr val="accent1"/>
+          </a:fillRef>
+          <a:effectRef idx="0">
+            <a:schemeClr val="accent1"/>
+          </a:effectRef>
+          <a:fontRef idx="minor">
+            <a:schemeClr val="lt1"/>
+          </a:fontRef>
+        </p:style>
+        <p:txBody>
+          <a:bodyPr rot="0" spcFirstLastPara="0" vertOverflow="overflow" horzOverflow="overflow" vert="horz" wrap="square" lIns="91440" tIns="45720" rIns="91440" bIns="45720" numCol="1" spcCol="0" rtlCol="0" fromWordArt="0" anchor="ctr" anchorCtr="0" forceAA="0" compatLnSpc="1">
+            <a:prstTxWarp prst="textNoShape">
+              <a:avLst/>
+            </a:prstTxWarp>
+            <a:noAutofit/>
+          </a:bodyPr>
+          <a:lstStyle/>
+          <a:p>
+            <a:pPr algn="ctr"/>
+            <a:endParaRPr lang="ko-KR" altLang="en-US"/>
+          </a:p>
+        </p:txBody>
+      </p:sp>
+      <p:pic>
+        <p:nvPicPr>
+          <p:cNvPr id="2051" name="Picture 3"/>
+          <p:cNvPicPr>
+            <a:picLocks noChangeAspect="1" noChangeArrowheads="1"/>
+          </p:cNvPicPr>
+          <p:nvPr/>
+        </p:nvPicPr>
+        <p:blipFill>
+          <a:blip r:embed="rId3" cstate="print"/>
+          <a:srcRect/>
+          <a:stretch>
+            <a:fillRect/>
+          </a:stretch>
+        </p:blipFill>
+        <p:spPr bwMode="auto">
+          <a:xfrm>
+            <a:off x="6012160" y="3717032"/>
+            <a:ext cx="2047875" cy="428625"/>
+          </a:xfrm>
+          <a:prstGeom prst="rect">
+            <a:avLst/>
+          </a:prstGeom>
+          <a:noFill/>
+          <a:ln w="9525">
+            <a:noFill/>
+            <a:miter lim="800000"/>
+            <a:headEnd/>
+            <a:tailEnd/>
+          </a:ln>
+        </p:spPr>
+      </p:pic>
+      <p:sp>
+        <p:nvSpPr>
+          <p:cNvPr id="8" name="TextBox 7"/>
+          <p:cNvSpPr txBox="1"/>
+          <p:nvPr/>
+        </p:nvSpPr>
+        <p:spPr>
+          <a:xfrm>
+            <a:off x="5652120" y="4293096"/>
+            <a:ext cx="3312368" cy="276999"/>
+          </a:xfrm>
+          <a:prstGeom prst="rect">
+            <a:avLst/>
+          </a:prstGeom>
+          <a:noFill/>
+        </p:spPr>
+        <p:txBody>
+          <a:bodyPr wrap="square" rtlCol="0">
+            <a:spAutoFit/>
+          </a:bodyPr>
+          <a:lstStyle/>
+          <a:p>
+            <a:pPr marL="228600" indent="-228600"/>
+            <a:r>
+              <a:rPr lang="en-US" altLang="ko-KR" sz="1200" dirty="0" smtClean="0">
+                <a:latin typeface="+mj-lt"/>
+              </a:rPr>
+              <a:t>2. </a:t>
+            </a:r>
+            <a:r>
+              <a:rPr lang="en-US" altLang="ko-KR" sz="1200" dirty="0" smtClean="0">
+                <a:latin typeface="+mj-lt"/>
+              </a:rPr>
+              <a:t>Button</a:t>
+            </a:r>
+            <a:r>
+              <a:rPr lang="ko-KR" altLang="en-US" sz="1200" dirty="0" smtClean="0">
+                <a:latin typeface="+mj-lt"/>
+              </a:rPr>
+              <a:t>의 이름을 </a:t>
+            </a:r>
+            <a:r>
+              <a:rPr lang="en-US" altLang="ko-KR" sz="1200" dirty="0" smtClean="0">
+                <a:latin typeface="+mj-lt"/>
+              </a:rPr>
+              <a:t>StartButton</a:t>
+            </a:r>
+            <a:r>
+              <a:rPr lang="ko-KR" altLang="en-US" sz="1200" dirty="0" smtClean="0">
+                <a:latin typeface="+mj-lt"/>
+              </a:rPr>
+              <a:t>으로 해줍니다</a:t>
+            </a:r>
+            <a:endParaRPr lang="ko-KR" altLang="en-US" sz="1200" dirty="0" smtClean="0">
+              <a:latin typeface="+mj-lt"/>
+            </a:endParaRPr>
+          </a:p>
+        </p:txBody>
+      </p:sp>
+      <p:sp>
+        <p:nvSpPr>
+          <p:cNvPr id="9" name="모서리가 둥근 직사각형 8"/>
+          <p:cNvSpPr/>
+          <p:nvPr/>
+        </p:nvSpPr>
+        <p:spPr>
+          <a:xfrm>
+            <a:off x="6480212" y="3681028"/>
+            <a:ext cx="900100" cy="255662"/>
+          </a:xfrm>
+          <a:prstGeom prst="roundRect">
+            <a:avLst/>
+          </a:prstGeom>
+          <a:noFill/>
+          <a:ln>
+            <a:solidFill>
+              <a:srgbClr val="FF0000"/>
+            </a:solidFill>
+          </a:ln>
+        </p:spPr>
+        <p:style>
+          <a:lnRef idx="2">
+            <a:schemeClr val="accent1">
+              <a:shade val="50000"/>
+            </a:schemeClr>
+          </a:lnRef>
+          <a:fillRef idx="1">
+            <a:schemeClr val="accent1"/>
+          </a:fillRef>
+          <a:effectRef idx="0">
+            <a:schemeClr val="accent1"/>
+          </a:effectRef>
+          <a:fontRef idx="minor">
+            <a:schemeClr val="lt1"/>
+          </a:fontRef>
+        </p:style>
+        <p:txBody>
+          <a:bodyPr rot="0" spcFirstLastPara="0" vertOverflow="overflow" horzOverflow="overflow" vert="horz" wrap="square" lIns="91440" tIns="45720" rIns="91440" bIns="45720" numCol="1" spcCol="0" rtlCol="0" fromWordArt="0" anchor="ctr" anchorCtr="0" forceAA="0" compatLnSpc="1">
+            <a:prstTxWarp prst="textNoShape">
+              <a:avLst/>
+            </a:prstTxWarp>
+            <a:noAutofit/>
+          </a:bodyPr>
+          <a:lstStyle/>
+          <a:p>
+            <a:pPr algn="ctr"/>
+            <a:endParaRPr lang="ko-KR" altLang="en-US"/>
           </a:p>
         </p:txBody>
       </p:sp>
     </p:spTree>
     <p:extLst>
       <p:ext uri="{BB962C8B-B14F-4D97-AF65-F5344CB8AC3E}">
-        <p14:creationId xmlns:p14="http://schemas.microsoft.com/office/powerpoint/2010/main" val="2617548621"/>
+        <p14:creationId xmlns:p14="http://schemas.microsoft.com/office/powerpoint/2010/main" xmlns="" val="2617548621"/>
       </p:ext>
     </p:extLst>
   </p:cSld>
   <p:clrMapOvr>
     <a:masterClrMapping/>
   </p:clrMapOvr>
-  <mc:AlternateContent xmlns:mc="http://schemas.openxmlformats.org/markup-compatibility/2006" xmlns:p14="http://schemas.microsoft.com/office/powerpoint/2010/main">
-    <mc:Choice Requires="p14">
+  <mc:AlternateContent xmlns:mc="http://schemas.openxmlformats.org/markup-compatibility/2006">
+    <mc:Choice xmlns:p14="http://schemas.microsoft.com/office/powerpoint/2010/main" xmlns="" Requires="p14">
       <p:transition spd="med" p14:dur="700">
         <p:fade/>
       </p:transition>
     </mc:Choice>
-    <mc:Fallback xmlns="">
+    <mc:Fallback>
       <p:transition spd="med">
         <p:fade/>
       </p:transition>
@@ -4483,58 +5102,25 @@
           <a:chExt cx="0" cy="0"/>
         </a:xfrm>
       </p:grpSpPr>
-      <p:sp>
-        <p:nvSpPr>
-          <p:cNvPr id="4" name="TextBox 3"/>
-          <p:cNvSpPr txBox="1"/>
-          <p:nvPr/>
-        </p:nvSpPr>
-        <p:spPr>
-          <a:xfrm>
-            <a:off x="522831" y="-6392"/>
-            <a:ext cx="6992989" cy="807324"/>
-          </a:xfrm>
-          <a:prstGeom prst="rect">
-            <a:avLst/>
-          </a:prstGeom>
-          <a:noFill/>
-        </p:spPr>
-        <p:txBody>
-          <a:bodyPr wrap="none" rtlCol="0" anchor="ctr">
-            <a:noAutofit/>
-          </a:bodyPr>
-          <a:lstStyle/>
-          <a:p>
-            <a:r>
-              <a:rPr lang="en-US" altLang="ko-KR" sz="3400" b="1" dirty="0" smtClean="0">
-                <a:solidFill>
-                  <a:srgbClr val="1CCAB9"/>
-                </a:solidFill>
-                <a:latin typeface="+mn-ea"/>
-              </a:rPr>
-              <a:t>Reference</a:t>
-            </a:r>
-            <a:endParaRPr lang="en-US" altLang="ko-KR" sz="3400" b="1" dirty="0">
-              <a:solidFill>
-                <a:srgbClr val="1CCAB9"/>
-              </a:solidFill>
-              <a:latin typeface="+mn-ea"/>
-            </a:endParaRPr>
-          </a:p>
-        </p:txBody>
-      </p:sp>
-      <p:sp>
-        <p:nvSpPr>
-          <p:cNvPr id="5" name="Rectangle 8"/>
-          <p:cNvSpPr>
-            <a:spLocks noChangeArrowheads="1"/>
-          </p:cNvSpPr>
-          <p:nvPr/>
-        </p:nvSpPr>
+      <p:pic>
+        <p:nvPicPr>
+          <p:cNvPr id="3074" name="Picture 2"/>
+          <p:cNvPicPr>
+            <a:picLocks noChangeAspect="1" noChangeArrowheads="1"/>
+          </p:cNvPicPr>
+          <p:nvPr/>
+        </p:nvPicPr>
+        <p:blipFill>
+          <a:blip r:embed="rId2" cstate="print"/>
+          <a:srcRect/>
+          <a:stretch>
+            <a:fillRect/>
+          </a:stretch>
+        </p:blipFill>
         <p:spPr bwMode="auto">
           <a:xfrm>
-            <a:off x="643719" y="1021080"/>
-            <a:ext cx="7856562" cy="276999"/>
+            <a:off x="323528" y="1052736"/>
+            <a:ext cx="2006600" cy="5156200"/>
           </a:xfrm>
           <a:prstGeom prst="rect">
             <a:avLst/>
@@ -4547,118 +5133,437 @@
             <a:tailEnd/>
           </a:ln>
         </p:spPr>
+      </p:pic>
+      <p:sp>
+        <p:nvSpPr>
+          <p:cNvPr id="3" name="모서리가 둥근 직사각형 2"/>
+          <p:cNvSpPr/>
+          <p:nvPr/>
+        </p:nvSpPr>
+        <p:spPr>
+          <a:xfrm>
+            <a:off x="575556" y="1304764"/>
+            <a:ext cx="612068" cy="255662"/>
+          </a:xfrm>
+          <a:prstGeom prst="roundRect">
+            <a:avLst/>
+          </a:prstGeom>
+          <a:noFill/>
+          <a:ln>
+            <a:solidFill>
+              <a:srgbClr val="FF0000"/>
+            </a:solidFill>
+          </a:ln>
+        </p:spPr>
+        <p:style>
+          <a:lnRef idx="2">
+            <a:schemeClr val="accent1">
+              <a:shade val="50000"/>
+            </a:schemeClr>
+          </a:lnRef>
+          <a:fillRef idx="1">
+            <a:schemeClr val="accent1"/>
+          </a:fillRef>
+          <a:effectRef idx="0">
+            <a:schemeClr val="accent1"/>
+          </a:effectRef>
+          <a:fontRef idx="minor">
+            <a:schemeClr val="lt1"/>
+          </a:fontRef>
+        </p:style>
         <p:txBody>
-          <a:bodyPr wrap="square">
-            <a:spAutoFit/>
-            <a:scene3d>
-              <a:camera prst="orthographicFront"/>
-              <a:lightRig rig="threePt" dir="t"/>
-            </a:scene3d>
-            <a:sp3d>
-              <a:bevelT w="1270" h="1270"/>
-            </a:sp3d>
+          <a:bodyPr rot="0" spcFirstLastPara="0" vertOverflow="overflow" horzOverflow="overflow" vert="horz" wrap="square" lIns="91440" tIns="45720" rIns="91440" bIns="45720" numCol="1" spcCol="0" rtlCol="0" fromWordArt="0" anchor="ctr" anchorCtr="0" forceAA="0" compatLnSpc="1">
+            <a:prstTxWarp prst="textNoShape">
+              <a:avLst/>
+            </a:prstTxWarp>
+            <a:noAutofit/>
           </a:bodyPr>
           <a:lstStyle/>
           <a:p>
-            <a:pPr>
-              <a:spcBef>
-                <a:spcPts val="600"/>
-              </a:spcBef>
-              <a:defRPr/>
-            </a:pPr>
-            <a:r>
-              <a:rPr lang="en-US" altLang="ko-KR" sz="1200" b="1" dirty="0" smtClean="0">
-                <a:latin typeface="맑은 고딕" pitchFamily="50" charset="-127"/>
-                <a:ea typeface="맑은 고딕" pitchFamily="50" charset="-127"/>
-              </a:rPr>
-              <a:t>1</a:t>
-            </a:r>
-            <a:r>
-              <a:rPr lang="en-US" altLang="ko-KR" sz="1200" b="1" dirty="0">
-                <a:latin typeface="맑은 고딕" pitchFamily="50" charset="-127"/>
-              </a:rPr>
-              <a:t>. </a:t>
-            </a:r>
-            <a:r>
-              <a:rPr lang="en-US" altLang="ko-KR" sz="1200" b="1" dirty="0">
-                <a:latin typeface="맑은 고딕" pitchFamily="50" charset="-127"/>
-                <a:hlinkClick r:id="rId2"/>
-              </a:rPr>
-              <a:t>http://ptline.com/?</a:t>
-            </a:r>
-            <a:r>
-              <a:rPr lang="en-US" altLang="ko-KR" sz="1200" b="1" dirty="0" smtClean="0">
-                <a:latin typeface="맑은 고딕" pitchFamily="50" charset="-127"/>
-                <a:hlinkClick r:id="rId2"/>
-              </a:rPr>
-              <a:t>p=10346</a:t>
-            </a:r>
-            <a:r>
-              <a:rPr lang="en-US" altLang="ko-KR" sz="1200" b="1" dirty="0" smtClean="0">
-                <a:latin typeface="맑은 고딕" pitchFamily="50" charset="-127"/>
-              </a:rPr>
-              <a:t> (</a:t>
-            </a:r>
-            <a:r>
-              <a:rPr lang="ko-KR" altLang="en-US" sz="1200" b="1" dirty="0" smtClean="0">
-                <a:latin typeface="맑은 고딕" pitchFamily="50" charset="-127"/>
-              </a:rPr>
-              <a:t>무료 </a:t>
-            </a:r>
-            <a:r>
-              <a:rPr lang="en-US" altLang="ko-KR" sz="1200" b="1" dirty="0" smtClean="0">
-                <a:latin typeface="맑은 고딕" pitchFamily="50" charset="-127"/>
-              </a:rPr>
-              <a:t>PPT </a:t>
-            </a:r>
-            <a:r>
-              <a:rPr lang="ko-KR" altLang="en-US" sz="1200" b="1" dirty="0" smtClean="0">
-                <a:latin typeface="맑은 고딕" pitchFamily="50" charset="-127"/>
-              </a:rPr>
-              <a:t>템플릿 사이트</a:t>
-            </a:r>
-            <a:r>
-              <a:rPr lang="en-US" altLang="ko-KR" sz="1200" b="1" dirty="0" smtClean="0">
-                <a:latin typeface="맑은 고딕" pitchFamily="50" charset="-127"/>
-              </a:rPr>
-              <a:t>)</a:t>
-            </a:r>
-            <a:endParaRPr lang="en-US" altLang="ko-KR" sz="1100" b="1" dirty="0">
-              <a:latin typeface="맑은 고딕" pitchFamily="50" charset="-127"/>
-              <a:ea typeface="맑은 고딕" pitchFamily="50" charset="-127"/>
+            <a:pPr algn="ctr"/>
+            <a:endParaRPr lang="ko-KR" altLang="en-US"/>
+          </a:p>
+        </p:txBody>
+      </p:sp>
+      <p:sp>
+        <p:nvSpPr>
+          <p:cNvPr id="4" name="TextBox 3"/>
+          <p:cNvSpPr txBox="1"/>
+          <p:nvPr/>
+        </p:nvSpPr>
+        <p:spPr>
+          <a:xfrm>
+            <a:off x="2519772" y="1052736"/>
+            <a:ext cx="4257063" cy="276999"/>
+          </a:xfrm>
+          <a:prstGeom prst="rect">
+            <a:avLst/>
+          </a:prstGeom>
+          <a:noFill/>
+        </p:spPr>
+        <p:txBody>
+          <a:bodyPr wrap="none" rtlCol="0">
+            <a:spAutoFit/>
+          </a:bodyPr>
+          <a:lstStyle/>
+          <a:p>
+            <a:r>
+              <a:rPr lang="en-US" altLang="ko-KR" sz="1200" dirty="0" smtClean="0">
+                <a:latin typeface="+mj-lt"/>
+              </a:rPr>
+              <a:t>1. Project - Create – C# Script</a:t>
+            </a:r>
+            <a:r>
+              <a:rPr lang="ko-KR" altLang="en-US" sz="1200" dirty="0" smtClean="0">
+                <a:latin typeface="+mj-lt"/>
+              </a:rPr>
+              <a:t>로 새 </a:t>
+            </a:r>
+            <a:r>
+              <a:rPr lang="en-US" altLang="ko-KR" sz="1200" dirty="0" smtClean="0">
+                <a:latin typeface="+mj-lt"/>
+              </a:rPr>
+              <a:t>Script</a:t>
+            </a:r>
+            <a:r>
+              <a:rPr lang="ko-KR" altLang="en-US" sz="1200" dirty="0" smtClean="0">
+                <a:latin typeface="+mj-lt"/>
+              </a:rPr>
+              <a:t>를 추가합니다</a:t>
+            </a:r>
+            <a:r>
+              <a:rPr lang="en-US" altLang="ko-KR" sz="1200" dirty="0" smtClean="0">
+                <a:latin typeface="+mj-lt"/>
+              </a:rPr>
+              <a:t>.</a:t>
+            </a:r>
+            <a:endParaRPr lang="ko-KR" altLang="en-US" sz="1200" dirty="0" smtClean="0">
+              <a:latin typeface="+mj-lt"/>
             </a:endParaRPr>
+          </a:p>
+        </p:txBody>
+      </p:sp>
+      <p:pic>
+        <p:nvPicPr>
+          <p:cNvPr id="3075" name="Picture 3"/>
+          <p:cNvPicPr>
+            <a:picLocks noChangeAspect="1" noChangeArrowheads="1"/>
+          </p:cNvPicPr>
+          <p:nvPr/>
+        </p:nvPicPr>
+        <p:blipFill>
+          <a:blip r:embed="rId3" cstate="print"/>
+          <a:srcRect/>
+          <a:stretch>
+            <a:fillRect/>
+          </a:stretch>
+        </p:blipFill>
+        <p:spPr bwMode="auto">
+          <a:xfrm>
+            <a:off x="3095836" y="1700808"/>
+            <a:ext cx="914400" cy="1057275"/>
+          </a:xfrm>
+          <a:prstGeom prst="rect">
+            <a:avLst/>
+          </a:prstGeom>
+          <a:noFill/>
+          <a:ln w="9525">
+            <a:noFill/>
+            <a:miter lim="800000"/>
+            <a:headEnd/>
+            <a:tailEnd/>
+          </a:ln>
+        </p:spPr>
+      </p:pic>
+      <p:sp>
+        <p:nvSpPr>
+          <p:cNvPr id="6" name="TextBox 5"/>
+          <p:cNvSpPr txBox="1"/>
+          <p:nvPr/>
+        </p:nvSpPr>
+        <p:spPr>
+          <a:xfrm>
+            <a:off x="4139952" y="1700808"/>
+            <a:ext cx="2672526" cy="276999"/>
+          </a:xfrm>
+          <a:prstGeom prst="rect">
+            <a:avLst/>
+          </a:prstGeom>
+          <a:noFill/>
+        </p:spPr>
+        <p:txBody>
+          <a:bodyPr wrap="none" rtlCol="0">
+            <a:spAutoFit/>
+          </a:bodyPr>
+          <a:lstStyle/>
+          <a:p>
+            <a:r>
+              <a:rPr lang="en-US" altLang="ko-KR" sz="1200" dirty="0" smtClean="0">
+                <a:latin typeface="+mj-lt"/>
+              </a:rPr>
+              <a:t>2. </a:t>
+            </a:r>
+            <a:r>
+              <a:rPr lang="ko-KR" altLang="en-US" sz="1200" dirty="0" smtClean="0">
+                <a:latin typeface="+mj-lt"/>
+              </a:rPr>
+              <a:t>이름은 </a:t>
+            </a:r>
+            <a:r>
+              <a:rPr lang="en-US" altLang="ko-KR" sz="1200" dirty="0" smtClean="0">
+                <a:latin typeface="+mj-lt"/>
+              </a:rPr>
+              <a:t>ChangeScene</a:t>
+            </a:r>
+            <a:r>
+              <a:rPr lang="ko-KR" altLang="en-US" sz="1200" dirty="0" smtClean="0">
+                <a:latin typeface="+mj-lt"/>
+              </a:rPr>
+              <a:t>로 바꿉니다</a:t>
+            </a:r>
+            <a:r>
+              <a:rPr lang="en-US" altLang="ko-KR" sz="1200" dirty="0" smtClean="0">
+                <a:latin typeface="+mj-lt"/>
+              </a:rPr>
+              <a:t>.</a:t>
+            </a:r>
+            <a:endParaRPr lang="ko-KR" altLang="en-US" sz="1200" dirty="0" smtClean="0">
+              <a:latin typeface="+mj-lt"/>
+            </a:endParaRPr>
+          </a:p>
+        </p:txBody>
+      </p:sp>
+      <p:pic>
+        <p:nvPicPr>
+          <p:cNvPr id="3076" name="Picture 4"/>
+          <p:cNvPicPr>
+            <a:picLocks noChangeAspect="1" noChangeArrowheads="1"/>
+          </p:cNvPicPr>
+          <p:nvPr/>
+        </p:nvPicPr>
+        <p:blipFill>
+          <a:blip r:embed="rId4" cstate="print"/>
+          <a:srcRect/>
+          <a:stretch>
+            <a:fillRect/>
+          </a:stretch>
+        </p:blipFill>
+        <p:spPr bwMode="auto">
+          <a:xfrm>
+            <a:off x="3347864" y="2960948"/>
+            <a:ext cx="2916324" cy="2772076"/>
+          </a:xfrm>
+          <a:prstGeom prst="rect">
+            <a:avLst/>
+          </a:prstGeom>
+          <a:noFill/>
+          <a:ln w="9525">
+            <a:noFill/>
+            <a:miter lim="800000"/>
+            <a:headEnd/>
+            <a:tailEnd/>
+          </a:ln>
+        </p:spPr>
+      </p:pic>
+      <p:sp>
+        <p:nvSpPr>
+          <p:cNvPr id="8" name="모서리가 둥근 직사각형 7"/>
+          <p:cNvSpPr/>
+          <p:nvPr/>
+        </p:nvSpPr>
+        <p:spPr>
+          <a:xfrm>
+            <a:off x="3599892" y="3320988"/>
+            <a:ext cx="2016224" cy="216024"/>
+          </a:xfrm>
+          <a:prstGeom prst="roundRect">
+            <a:avLst/>
+          </a:prstGeom>
+          <a:noFill/>
+          <a:ln>
+            <a:solidFill>
+              <a:srgbClr val="FF0000"/>
+            </a:solidFill>
+          </a:ln>
+        </p:spPr>
+        <p:style>
+          <a:lnRef idx="2">
+            <a:schemeClr val="accent1">
+              <a:shade val="50000"/>
+            </a:schemeClr>
+          </a:lnRef>
+          <a:fillRef idx="1">
+            <a:schemeClr val="accent1"/>
+          </a:fillRef>
+          <a:effectRef idx="0">
+            <a:schemeClr val="accent1"/>
+          </a:effectRef>
+          <a:fontRef idx="minor">
+            <a:schemeClr val="lt1"/>
+          </a:fontRef>
+        </p:style>
+        <p:txBody>
+          <a:bodyPr rot="0" spcFirstLastPara="0" vertOverflow="overflow" horzOverflow="overflow" vert="horz" wrap="square" lIns="91440" tIns="45720" rIns="91440" bIns="45720" numCol="1" spcCol="0" rtlCol="0" fromWordArt="0" anchor="ctr" anchorCtr="0" forceAA="0" compatLnSpc="1">
+            <a:prstTxWarp prst="textNoShape">
+              <a:avLst/>
+            </a:prstTxWarp>
+            <a:noAutofit/>
+          </a:bodyPr>
+          <a:lstStyle/>
+          <a:p>
+            <a:pPr algn="ctr"/>
+            <a:endParaRPr lang="ko-KR" altLang="en-US"/>
+          </a:p>
+        </p:txBody>
+      </p:sp>
+      <p:sp>
+        <p:nvSpPr>
+          <p:cNvPr id="9" name="모서리가 둥근 직사각형 8"/>
+          <p:cNvSpPr/>
+          <p:nvPr/>
+        </p:nvSpPr>
+        <p:spPr>
+          <a:xfrm>
+            <a:off x="3779912" y="5157192"/>
+            <a:ext cx="2268252" cy="540060"/>
+          </a:xfrm>
+          <a:prstGeom prst="roundRect">
+            <a:avLst/>
+          </a:prstGeom>
+          <a:noFill/>
+          <a:ln>
+            <a:solidFill>
+              <a:srgbClr val="FF0000"/>
+            </a:solidFill>
+          </a:ln>
+        </p:spPr>
+        <p:style>
+          <a:lnRef idx="2">
+            <a:schemeClr val="accent1">
+              <a:shade val="50000"/>
+            </a:schemeClr>
+          </a:lnRef>
+          <a:fillRef idx="1">
+            <a:schemeClr val="accent1"/>
+          </a:fillRef>
+          <a:effectRef idx="0">
+            <a:schemeClr val="accent1"/>
+          </a:effectRef>
+          <a:fontRef idx="minor">
+            <a:schemeClr val="lt1"/>
+          </a:fontRef>
+        </p:style>
+        <p:txBody>
+          <a:bodyPr rot="0" spcFirstLastPara="0" vertOverflow="overflow" horzOverflow="overflow" vert="horz" wrap="square" lIns="91440" tIns="45720" rIns="91440" bIns="45720" numCol="1" spcCol="0" rtlCol="0" fromWordArt="0" anchor="ctr" anchorCtr="0" forceAA="0" compatLnSpc="1">
+            <a:prstTxWarp prst="textNoShape">
+              <a:avLst/>
+            </a:prstTxWarp>
+            <a:noAutofit/>
+          </a:bodyPr>
+          <a:lstStyle/>
+          <a:p>
+            <a:pPr algn="ctr"/>
+            <a:endParaRPr lang="ko-KR" altLang="en-US"/>
+          </a:p>
+        </p:txBody>
+      </p:sp>
+      <p:sp>
+        <p:nvSpPr>
+          <p:cNvPr id="10" name="TextBox 9"/>
+          <p:cNvSpPr txBox="1"/>
+          <p:nvPr/>
+        </p:nvSpPr>
+        <p:spPr>
+          <a:xfrm>
+            <a:off x="6300192" y="2924944"/>
+            <a:ext cx="2741456" cy="276999"/>
+          </a:xfrm>
+          <a:prstGeom prst="rect">
+            <a:avLst/>
+          </a:prstGeom>
+          <a:noFill/>
+        </p:spPr>
+        <p:txBody>
+          <a:bodyPr wrap="none" rtlCol="0">
+            <a:spAutoFit/>
+          </a:bodyPr>
+          <a:lstStyle/>
+          <a:p>
+            <a:r>
+              <a:rPr lang="en-US" altLang="ko-KR" sz="1200" dirty="0" smtClean="0">
+                <a:latin typeface="+mj-lt"/>
+              </a:rPr>
+              <a:t>3. </a:t>
+            </a:r>
+            <a:r>
+              <a:rPr lang="ko-KR" altLang="en-US" sz="1200" dirty="0" smtClean="0">
+                <a:latin typeface="+mj-lt"/>
+              </a:rPr>
+              <a:t>빨간색 네모의 </a:t>
+            </a:r>
+            <a:r>
+              <a:rPr lang="en-US" altLang="ko-KR" sz="1200" dirty="0" smtClean="0">
+                <a:latin typeface="+mj-lt"/>
+              </a:rPr>
+              <a:t>code</a:t>
+            </a:r>
+            <a:r>
+              <a:rPr lang="ko-KR" altLang="en-US" sz="1200" dirty="0" smtClean="0">
+                <a:latin typeface="+mj-lt"/>
+              </a:rPr>
+              <a:t>를 추가합니다</a:t>
+            </a:r>
+            <a:r>
+              <a:rPr lang="en-US" altLang="ko-KR" sz="1200" dirty="0" smtClean="0">
+                <a:latin typeface="+mj-lt"/>
+              </a:rPr>
+              <a:t>.</a:t>
+            </a:r>
+            <a:endParaRPr lang="ko-KR" altLang="en-US" sz="1200" dirty="0" smtClean="0">
+              <a:latin typeface="+mj-lt"/>
+            </a:endParaRPr>
+          </a:p>
+        </p:txBody>
+      </p:sp>
+      <p:sp>
+        <p:nvSpPr>
+          <p:cNvPr id="11" name="TextBox 10"/>
+          <p:cNvSpPr txBox="1"/>
+          <p:nvPr/>
+        </p:nvSpPr>
+        <p:spPr>
+          <a:xfrm>
+            <a:off x="522831" y="-6392"/>
+            <a:ext cx="6992989" cy="807324"/>
+          </a:xfrm>
+          <a:prstGeom prst="rect">
+            <a:avLst/>
+          </a:prstGeom>
+          <a:noFill/>
+        </p:spPr>
+        <p:txBody>
+          <a:bodyPr wrap="none" rtlCol="0" anchor="ctr">
+            <a:noAutofit/>
+          </a:bodyPr>
+          <a:lstStyle/>
+          <a:p>
+            <a:r>
+              <a:rPr lang="en-US" altLang="ko-KR" sz="3400" b="1" dirty="0" smtClean="0">
+                <a:solidFill>
+                  <a:srgbClr val="1CCAB9"/>
+                </a:solidFill>
+                <a:latin typeface="+mn-ea"/>
+              </a:rPr>
+              <a:t>Scene Manager</a:t>
+            </a:r>
           </a:p>
         </p:txBody>
       </p:sp>
     </p:spTree>
-    <p:extLst>
-      <p:ext uri="{BB962C8B-B14F-4D97-AF65-F5344CB8AC3E}">
-        <p14:creationId xmlns:p14="http://schemas.microsoft.com/office/powerpoint/2010/main" val="1257673598"/>
-      </p:ext>
-    </p:extLst>
   </p:cSld>
   <p:clrMapOvr>
     <a:masterClrMapping/>
   </p:clrMapOvr>
-  <mc:AlternateContent xmlns:mc="http://schemas.openxmlformats.org/markup-compatibility/2006" xmlns:p14="http://schemas.microsoft.com/office/powerpoint/2010/main">
-    <mc:Choice Requires="p14">
-      <p:transition spd="med" p14:dur="700">
-        <p:fade/>
-      </p:transition>
-    </mc:Choice>
-    <mc:Fallback xmlns="">
-      <p:transition spd="med">
-        <p:fade/>
-      </p:transition>
-    </mc:Fallback>
-  </mc:AlternateContent>
-  <p:timing>
-    <p:tnLst>
-      <p:par>
-        <p:cTn id="1" dur="indefinite" restart="never" nodeType="tmRoot"/>
-      </p:par>
-    </p:tnLst>
-  </p:timing>
 </p:sld>
 </file>
 
@@ -4906,12 +5811,6 @@
                 </a:rPr>
                 <a:t>Ⅰ</a:t>
               </a:r>
-              <a:endParaRPr lang="en-US" altLang="ko-KR" spc="-50" dirty="0" smtClean="0">
-                <a:solidFill>
-                  <a:schemeClr val="bg1"/>
-                </a:solidFill>
-                <a:latin typeface="+mn-ea"/>
-              </a:endParaRPr>
             </a:p>
           </p:txBody>
         </p:sp>
@@ -5102,12 +6001,6 @@
                 </a:rPr>
                 <a:t>Ⅱ</a:t>
               </a:r>
-              <a:endParaRPr lang="en-US" altLang="ko-KR" spc="-50" dirty="0" smtClean="0">
-                <a:solidFill>
-                  <a:schemeClr val="bg1"/>
-                </a:solidFill>
-                <a:latin typeface="+mn-ea"/>
-              </a:endParaRPr>
             </a:p>
           </p:txBody>
         </p:sp>
@@ -5298,12 +6191,6 @@
                 </a:rPr>
                 <a:t>Ⅲ</a:t>
               </a:r>
-              <a:endParaRPr lang="en-US" altLang="ko-KR" spc="-50" dirty="0" smtClean="0">
-                <a:solidFill>
-                  <a:schemeClr val="bg1"/>
-                </a:solidFill>
-                <a:latin typeface="+mn-ea"/>
-              </a:endParaRPr>
             </a:p>
           </p:txBody>
         </p:sp>
@@ -5494,12 +6381,6 @@
                 </a:rPr>
                 <a:t>Ⅳ</a:t>
               </a:r>
-              <a:endParaRPr lang="en-US" altLang="ko-KR" spc="-50" dirty="0" smtClean="0">
-                <a:solidFill>
-                  <a:schemeClr val="bg1"/>
-                </a:solidFill>
-                <a:latin typeface="+mn-ea"/>
-              </a:endParaRPr>
             </a:p>
           </p:txBody>
         </p:sp>
@@ -5690,12 +6571,6 @@
                 </a:rPr>
                 <a:t>Ⅴ</a:t>
               </a:r>
-              <a:endParaRPr lang="en-US" altLang="ko-KR" spc="-50" dirty="0" smtClean="0">
-                <a:solidFill>
-                  <a:schemeClr val="bg1"/>
-                </a:solidFill>
-                <a:latin typeface="+mn-ea"/>
-              </a:endParaRPr>
             </a:p>
           </p:txBody>
         </p:sp>
@@ -5703,20 +6578,20 @@
     </p:spTree>
     <p:extLst>
       <p:ext uri="{BB962C8B-B14F-4D97-AF65-F5344CB8AC3E}">
-        <p14:creationId xmlns:p14="http://schemas.microsoft.com/office/powerpoint/2010/main" val="3934354063"/>
+        <p14:creationId xmlns:p14="http://schemas.microsoft.com/office/powerpoint/2010/main" xmlns="" val="3934354063"/>
       </p:ext>
     </p:extLst>
   </p:cSld>
   <p:clrMapOvr>
     <a:masterClrMapping/>
   </p:clrMapOvr>
-  <mc:AlternateContent xmlns:mc="http://schemas.openxmlformats.org/markup-compatibility/2006" xmlns:p14="http://schemas.microsoft.com/office/powerpoint/2010/main">
-    <mc:Choice Requires="p14">
+  <mc:AlternateContent xmlns:mc="http://schemas.openxmlformats.org/markup-compatibility/2006">
+    <mc:Choice xmlns:p14="http://schemas.microsoft.com/office/powerpoint/2010/main" xmlns="" Requires="p14">
       <p:transition spd="med" p14:dur="700">
         <p:fade/>
       </p:transition>
     </mc:Choice>
-    <mc:Fallback xmlns="">
+    <mc:Fallback>
       <p:transition spd="med">
         <p:fade/>
       </p:transition>
@@ -5751,6 +6626,1407 @@
       </p:grpSpPr>
       <p:sp>
         <p:nvSpPr>
+          <p:cNvPr id="2" name="TextBox 1"/>
+          <p:cNvSpPr txBox="1"/>
+          <p:nvPr/>
+        </p:nvSpPr>
+        <p:spPr>
+          <a:xfrm>
+            <a:off x="522831" y="-6392"/>
+            <a:ext cx="6992989" cy="807324"/>
+          </a:xfrm>
+          <a:prstGeom prst="rect">
+            <a:avLst/>
+          </a:prstGeom>
+          <a:noFill/>
+        </p:spPr>
+        <p:txBody>
+          <a:bodyPr wrap="none" rtlCol="0" anchor="ctr">
+            <a:noAutofit/>
+          </a:bodyPr>
+          <a:lstStyle/>
+          <a:p>
+            <a:r>
+              <a:rPr lang="en-US" altLang="ko-KR" sz="3400" b="1" dirty="0" smtClean="0">
+                <a:solidFill>
+                  <a:srgbClr val="1CCAB9"/>
+                </a:solidFill>
+                <a:latin typeface="+mn-ea"/>
+              </a:rPr>
+              <a:t>Scene Manager</a:t>
+            </a:r>
+          </a:p>
+        </p:txBody>
+      </p:sp>
+      <p:pic>
+        <p:nvPicPr>
+          <p:cNvPr id="4100" name="Picture 4"/>
+          <p:cNvPicPr>
+            <a:picLocks noChangeAspect="1" noChangeArrowheads="1"/>
+          </p:cNvPicPr>
+          <p:nvPr/>
+        </p:nvPicPr>
+        <p:blipFill>
+          <a:blip r:embed="rId2" cstate="print"/>
+          <a:srcRect/>
+          <a:stretch>
+            <a:fillRect/>
+          </a:stretch>
+        </p:blipFill>
+        <p:spPr bwMode="auto">
+          <a:xfrm>
+            <a:off x="251520" y="1160748"/>
+            <a:ext cx="3775489" cy="1778310"/>
+          </a:xfrm>
+          <a:prstGeom prst="rect">
+            <a:avLst/>
+          </a:prstGeom>
+          <a:noFill/>
+          <a:ln w="9525">
+            <a:noFill/>
+            <a:miter lim="800000"/>
+            <a:headEnd/>
+            <a:tailEnd/>
+          </a:ln>
+        </p:spPr>
+      </p:pic>
+      <p:pic>
+        <p:nvPicPr>
+          <p:cNvPr id="4101" name="Picture 5"/>
+          <p:cNvPicPr>
+            <a:picLocks noChangeAspect="1" noChangeArrowheads="1"/>
+          </p:cNvPicPr>
+          <p:nvPr/>
+        </p:nvPicPr>
+        <p:blipFill>
+          <a:blip r:embed="rId3" cstate="print"/>
+          <a:srcRect/>
+          <a:stretch>
+            <a:fillRect/>
+          </a:stretch>
+        </p:blipFill>
+        <p:spPr bwMode="auto">
+          <a:xfrm>
+            <a:off x="287524" y="3645024"/>
+            <a:ext cx="3209925" cy="1438275"/>
+          </a:xfrm>
+          <a:prstGeom prst="rect">
+            <a:avLst/>
+          </a:prstGeom>
+          <a:noFill/>
+          <a:ln w="9525">
+            <a:noFill/>
+            <a:miter lim="800000"/>
+            <a:headEnd/>
+            <a:tailEnd/>
+          </a:ln>
+        </p:spPr>
+      </p:pic>
+      <p:sp>
+        <p:nvSpPr>
+          <p:cNvPr id="7" name="모서리가 둥근 직사각형 6"/>
+          <p:cNvSpPr/>
+          <p:nvPr/>
+        </p:nvSpPr>
+        <p:spPr>
+          <a:xfrm>
+            <a:off x="395536" y="3933056"/>
+            <a:ext cx="900100" cy="1044116"/>
+          </a:xfrm>
+          <a:prstGeom prst="roundRect">
+            <a:avLst/>
+          </a:prstGeom>
+          <a:noFill/>
+          <a:ln>
+            <a:solidFill>
+              <a:srgbClr val="FF0000"/>
+            </a:solidFill>
+          </a:ln>
+        </p:spPr>
+        <p:style>
+          <a:lnRef idx="2">
+            <a:schemeClr val="accent1">
+              <a:shade val="50000"/>
+            </a:schemeClr>
+          </a:lnRef>
+          <a:fillRef idx="1">
+            <a:schemeClr val="accent1"/>
+          </a:fillRef>
+          <a:effectRef idx="0">
+            <a:schemeClr val="accent1"/>
+          </a:effectRef>
+          <a:fontRef idx="minor">
+            <a:schemeClr val="lt1"/>
+          </a:fontRef>
+        </p:style>
+        <p:txBody>
+          <a:bodyPr rot="0" spcFirstLastPara="0" vertOverflow="overflow" horzOverflow="overflow" vert="horz" wrap="square" lIns="91440" tIns="45720" rIns="91440" bIns="45720" numCol="1" spcCol="0" rtlCol="0" fromWordArt="0" anchor="ctr" anchorCtr="0" forceAA="0" compatLnSpc="1">
+            <a:prstTxWarp prst="textNoShape">
+              <a:avLst/>
+            </a:prstTxWarp>
+            <a:noAutofit/>
+          </a:bodyPr>
+          <a:lstStyle/>
+          <a:p>
+            <a:pPr algn="ctr"/>
+            <a:endParaRPr lang="ko-KR" altLang="en-US"/>
+          </a:p>
+        </p:txBody>
+      </p:sp>
+      <p:sp>
+        <p:nvSpPr>
+          <p:cNvPr id="8" name="모서리가 둥근 직사각형 7"/>
+          <p:cNvSpPr/>
+          <p:nvPr/>
+        </p:nvSpPr>
+        <p:spPr>
+          <a:xfrm>
+            <a:off x="431540" y="2672916"/>
+            <a:ext cx="900100" cy="180020"/>
+          </a:xfrm>
+          <a:prstGeom prst="roundRect">
+            <a:avLst/>
+          </a:prstGeom>
+          <a:noFill/>
+          <a:ln>
+            <a:solidFill>
+              <a:srgbClr val="FF0000"/>
+            </a:solidFill>
+          </a:ln>
+        </p:spPr>
+        <p:style>
+          <a:lnRef idx="2">
+            <a:schemeClr val="accent1">
+              <a:shade val="50000"/>
+            </a:schemeClr>
+          </a:lnRef>
+          <a:fillRef idx="1">
+            <a:schemeClr val="accent1"/>
+          </a:fillRef>
+          <a:effectRef idx="0">
+            <a:schemeClr val="accent1"/>
+          </a:effectRef>
+          <a:fontRef idx="minor">
+            <a:schemeClr val="lt1"/>
+          </a:fontRef>
+        </p:style>
+        <p:txBody>
+          <a:bodyPr rot="0" spcFirstLastPara="0" vertOverflow="overflow" horzOverflow="overflow" vert="horz" wrap="square" lIns="91440" tIns="45720" rIns="91440" bIns="45720" numCol="1" spcCol="0" rtlCol="0" fromWordArt="0" anchor="ctr" anchorCtr="0" forceAA="0" compatLnSpc="1">
+            <a:prstTxWarp prst="textNoShape">
+              <a:avLst/>
+            </a:prstTxWarp>
+            <a:noAutofit/>
+          </a:bodyPr>
+          <a:lstStyle/>
+          <a:p>
+            <a:pPr algn="ctr"/>
+            <a:endParaRPr lang="ko-KR" altLang="en-US"/>
+          </a:p>
+        </p:txBody>
+      </p:sp>
+      <p:cxnSp>
+        <p:nvCxnSpPr>
+          <p:cNvPr id="10" name="직선 화살표 연결선 9"/>
+          <p:cNvCxnSpPr>
+            <a:stCxn id="7" idx="0"/>
+            <a:endCxn id="8" idx="2"/>
+          </p:cNvCxnSpPr>
+          <p:nvPr/>
+        </p:nvCxnSpPr>
+        <p:spPr>
+          <a:xfrm flipV="1">
+            <a:off x="845586" y="2852936"/>
+            <a:ext cx="36004" cy="1080120"/>
+          </a:xfrm>
+          <a:prstGeom prst="straightConnector1">
+            <a:avLst/>
+          </a:prstGeom>
+          <a:ln>
+            <a:solidFill>
+              <a:srgbClr val="FF0000"/>
+            </a:solidFill>
+            <a:tailEnd type="arrow"/>
+          </a:ln>
+        </p:spPr>
+        <p:style>
+          <a:lnRef idx="1">
+            <a:schemeClr val="accent1"/>
+          </a:lnRef>
+          <a:fillRef idx="0">
+            <a:schemeClr val="accent1"/>
+          </a:fillRef>
+          <a:effectRef idx="0">
+            <a:schemeClr val="accent1"/>
+          </a:effectRef>
+          <a:fontRef idx="minor">
+            <a:schemeClr val="tx1"/>
+          </a:fontRef>
+        </p:style>
+      </p:cxnSp>
+      <p:sp>
+        <p:nvSpPr>
+          <p:cNvPr id="12" name="TextBox 11"/>
+          <p:cNvSpPr txBox="1"/>
+          <p:nvPr/>
+        </p:nvSpPr>
+        <p:spPr>
+          <a:xfrm>
+            <a:off x="4175956" y="1124744"/>
+            <a:ext cx="4560094" cy="276999"/>
+          </a:xfrm>
+          <a:prstGeom prst="rect">
+            <a:avLst/>
+          </a:prstGeom>
+          <a:noFill/>
+        </p:spPr>
+        <p:txBody>
+          <a:bodyPr wrap="none" rtlCol="0">
+            <a:spAutoFit/>
+          </a:bodyPr>
+          <a:lstStyle/>
+          <a:p>
+            <a:r>
+              <a:rPr lang="en-US" altLang="ko-KR" sz="1200" dirty="0" smtClean="0">
+                <a:latin typeface="+mj-lt"/>
+              </a:rPr>
+              <a:t>1. ChangeScene</a:t>
+            </a:r>
+            <a:r>
+              <a:rPr lang="ko-KR" altLang="en-US" sz="1200" dirty="0" smtClean="0">
+                <a:latin typeface="+mj-lt"/>
+              </a:rPr>
+              <a:t>를 </a:t>
+            </a:r>
+            <a:r>
+              <a:rPr lang="en-US" altLang="ko-KR" sz="1200" dirty="0" smtClean="0">
+                <a:latin typeface="+mj-lt"/>
+              </a:rPr>
+              <a:t>StartButton</a:t>
+            </a:r>
+            <a:r>
+              <a:rPr lang="ko-KR" altLang="en-US" sz="1200" dirty="0" smtClean="0">
+                <a:latin typeface="+mj-lt"/>
+              </a:rPr>
+              <a:t>에 </a:t>
+            </a:r>
+            <a:r>
+              <a:rPr lang="en-US" altLang="ko-KR" sz="1200" dirty="0" smtClean="0">
+                <a:latin typeface="+mj-lt"/>
+              </a:rPr>
+              <a:t>Drag &amp; Drop</a:t>
+            </a:r>
+            <a:r>
+              <a:rPr lang="ko-KR" altLang="en-US" sz="1200" dirty="0" smtClean="0">
+                <a:latin typeface="+mj-lt"/>
+              </a:rPr>
+              <a:t>하여 추가합니다</a:t>
+            </a:r>
+            <a:endParaRPr lang="ko-KR" altLang="en-US" sz="1200" dirty="0" smtClean="0">
+              <a:latin typeface="+mj-lt"/>
+            </a:endParaRPr>
+          </a:p>
+        </p:txBody>
+      </p:sp>
+    </p:spTree>
+  </p:cSld>
+  <p:clrMapOvr>
+    <a:masterClrMapping/>
+  </p:clrMapOvr>
+</p:sld>
+</file>
+
+<file path=ppt/slides/slide21.xml><?xml version="1.0" encoding="utf-8"?>
+<p:sld xmlns:a="http://schemas.openxmlformats.org/drawingml/2006/main" xmlns:r="http://schemas.openxmlformats.org/officeDocument/2006/relationships" xmlns:p="http://schemas.openxmlformats.org/presentationml/2006/main">
+  <p:cSld>
+    <p:spTree>
+      <p:nvGrpSpPr>
+        <p:cNvPr id="1" name=""/>
+        <p:cNvGrpSpPr/>
+        <p:nvPr/>
+      </p:nvGrpSpPr>
+      <p:grpSpPr>
+        <a:xfrm>
+          <a:off x="0" y="0"/>
+          <a:ext cx="0" cy="0"/>
+          <a:chOff x="0" y="0"/>
+          <a:chExt cx="0" cy="0"/>
+        </a:xfrm>
+      </p:grpSpPr>
+      <p:pic>
+        <p:nvPicPr>
+          <p:cNvPr id="5122" name="Picture 2"/>
+          <p:cNvPicPr>
+            <a:picLocks noChangeAspect="1" noChangeArrowheads="1"/>
+          </p:cNvPicPr>
+          <p:nvPr/>
+        </p:nvPicPr>
+        <p:blipFill>
+          <a:blip r:embed="rId2" cstate="print"/>
+          <a:srcRect/>
+          <a:stretch>
+            <a:fillRect/>
+          </a:stretch>
+        </p:blipFill>
+        <p:spPr bwMode="auto">
+          <a:xfrm>
+            <a:off x="179511" y="980728"/>
+            <a:ext cx="4236771" cy="648072"/>
+          </a:xfrm>
+          <a:prstGeom prst="rect">
+            <a:avLst/>
+          </a:prstGeom>
+          <a:noFill/>
+          <a:ln w="9525">
+            <a:noFill/>
+            <a:miter lim="800000"/>
+            <a:headEnd/>
+            <a:tailEnd/>
+          </a:ln>
+        </p:spPr>
+      </p:pic>
+      <p:sp>
+        <p:nvSpPr>
+          <p:cNvPr id="3" name="모서리가 둥근 직사각형 2"/>
+          <p:cNvSpPr/>
+          <p:nvPr/>
+        </p:nvSpPr>
+        <p:spPr>
+          <a:xfrm>
+            <a:off x="1295636" y="1340768"/>
+            <a:ext cx="213106" cy="213106"/>
+          </a:xfrm>
+          <a:prstGeom prst="roundRect">
+            <a:avLst/>
+          </a:prstGeom>
+          <a:noFill/>
+          <a:ln>
+            <a:solidFill>
+              <a:srgbClr val="FF0000"/>
+            </a:solidFill>
+          </a:ln>
+        </p:spPr>
+        <p:style>
+          <a:lnRef idx="2">
+            <a:schemeClr val="accent1">
+              <a:shade val="50000"/>
+            </a:schemeClr>
+          </a:lnRef>
+          <a:fillRef idx="1">
+            <a:schemeClr val="accent1"/>
+          </a:fillRef>
+          <a:effectRef idx="0">
+            <a:schemeClr val="accent1"/>
+          </a:effectRef>
+          <a:fontRef idx="minor">
+            <a:schemeClr val="lt1"/>
+          </a:fontRef>
+        </p:style>
+        <p:txBody>
+          <a:bodyPr rot="0" spcFirstLastPara="0" vertOverflow="overflow" horzOverflow="overflow" vert="horz" wrap="square" lIns="91440" tIns="45720" rIns="91440" bIns="45720" numCol="1" spcCol="0" rtlCol="0" fromWordArt="0" anchor="ctr" anchorCtr="0" forceAA="0" compatLnSpc="1">
+            <a:prstTxWarp prst="textNoShape">
+              <a:avLst/>
+            </a:prstTxWarp>
+            <a:noAutofit/>
+          </a:bodyPr>
+          <a:lstStyle/>
+          <a:p>
+            <a:pPr algn="ctr"/>
+            <a:endParaRPr lang="ko-KR" altLang="en-US"/>
+          </a:p>
+        </p:txBody>
+      </p:sp>
+      <p:sp>
+        <p:nvSpPr>
+          <p:cNvPr id="4" name="TextBox 3"/>
+          <p:cNvSpPr txBox="1"/>
+          <p:nvPr/>
+        </p:nvSpPr>
+        <p:spPr>
+          <a:xfrm>
+            <a:off x="4680012" y="1052736"/>
+            <a:ext cx="3828099" cy="276999"/>
+          </a:xfrm>
+          <a:prstGeom prst="rect">
+            <a:avLst/>
+          </a:prstGeom>
+          <a:noFill/>
+        </p:spPr>
+        <p:txBody>
+          <a:bodyPr wrap="none" rtlCol="0">
+            <a:spAutoFit/>
+          </a:bodyPr>
+          <a:lstStyle/>
+          <a:p>
+            <a:r>
+              <a:rPr lang="en-US" altLang="ko-KR" sz="1200" dirty="0" smtClean="0">
+                <a:latin typeface="+mj-lt"/>
+              </a:rPr>
+              <a:t>1.</a:t>
+            </a:r>
+            <a:r>
+              <a:rPr lang="ko-KR" altLang="en-US" sz="1200" dirty="0" smtClean="0">
+                <a:latin typeface="+mj-lt"/>
+              </a:rPr>
+              <a:t> </a:t>
+            </a:r>
+            <a:r>
+              <a:rPr lang="ko-KR" altLang="en-US" sz="1200" dirty="0" smtClean="0">
+                <a:latin typeface="+mj-lt"/>
+              </a:rPr>
+              <a:t>빨간색 네모를 클릭하여 </a:t>
+            </a:r>
+            <a:r>
+              <a:rPr lang="en-US" altLang="ko-KR" sz="1200" dirty="0" smtClean="0">
+                <a:latin typeface="+mj-lt"/>
+              </a:rPr>
+              <a:t>StartButton</a:t>
+            </a:r>
+            <a:r>
+              <a:rPr lang="ko-KR" altLang="en-US" sz="1200" dirty="0" smtClean="0">
+                <a:latin typeface="+mj-lt"/>
+              </a:rPr>
+              <a:t>를 추가합니다</a:t>
+            </a:r>
+            <a:endParaRPr lang="ko-KR" altLang="en-US" sz="1200" dirty="0" smtClean="0">
+              <a:latin typeface="+mj-lt"/>
+            </a:endParaRPr>
+          </a:p>
+        </p:txBody>
+      </p:sp>
+      <p:pic>
+        <p:nvPicPr>
+          <p:cNvPr id="5123" name="Picture 3"/>
+          <p:cNvPicPr>
+            <a:picLocks noChangeAspect="1" noChangeArrowheads="1"/>
+          </p:cNvPicPr>
+          <p:nvPr/>
+        </p:nvPicPr>
+        <p:blipFill>
+          <a:blip r:embed="rId3" cstate="print"/>
+          <a:srcRect/>
+          <a:stretch>
+            <a:fillRect/>
+          </a:stretch>
+        </p:blipFill>
+        <p:spPr bwMode="auto">
+          <a:xfrm>
+            <a:off x="251520" y="1808820"/>
+            <a:ext cx="1430195" cy="3009131"/>
+          </a:xfrm>
+          <a:prstGeom prst="rect">
+            <a:avLst/>
+          </a:prstGeom>
+          <a:noFill/>
+          <a:ln w="9525">
+            <a:noFill/>
+            <a:miter lim="800000"/>
+            <a:headEnd/>
+            <a:tailEnd/>
+          </a:ln>
+        </p:spPr>
+      </p:pic>
+      <p:sp>
+        <p:nvSpPr>
+          <p:cNvPr id="6" name="모서리가 둥근 직사각형 5"/>
+          <p:cNvSpPr/>
+          <p:nvPr/>
+        </p:nvSpPr>
+        <p:spPr>
+          <a:xfrm>
+            <a:off x="323528" y="3465004"/>
+            <a:ext cx="720080" cy="144016"/>
+          </a:xfrm>
+          <a:prstGeom prst="roundRect">
+            <a:avLst/>
+          </a:prstGeom>
+          <a:noFill/>
+          <a:ln>
+            <a:solidFill>
+              <a:srgbClr val="FF0000"/>
+            </a:solidFill>
+          </a:ln>
+        </p:spPr>
+        <p:style>
+          <a:lnRef idx="2">
+            <a:schemeClr val="accent1">
+              <a:shade val="50000"/>
+            </a:schemeClr>
+          </a:lnRef>
+          <a:fillRef idx="1">
+            <a:schemeClr val="accent1"/>
+          </a:fillRef>
+          <a:effectRef idx="0">
+            <a:schemeClr val="accent1"/>
+          </a:effectRef>
+          <a:fontRef idx="minor">
+            <a:schemeClr val="lt1"/>
+          </a:fontRef>
+        </p:style>
+        <p:txBody>
+          <a:bodyPr rot="0" spcFirstLastPara="0" vertOverflow="overflow" horzOverflow="overflow" vert="horz" wrap="square" lIns="91440" tIns="45720" rIns="91440" bIns="45720" numCol="1" spcCol="0" rtlCol="0" fromWordArt="0" anchor="ctr" anchorCtr="0" forceAA="0" compatLnSpc="1">
+            <a:prstTxWarp prst="textNoShape">
+              <a:avLst/>
+            </a:prstTxWarp>
+            <a:noAutofit/>
+          </a:bodyPr>
+          <a:lstStyle/>
+          <a:p>
+            <a:pPr algn="ctr"/>
+            <a:endParaRPr lang="ko-KR" altLang="en-US"/>
+          </a:p>
+        </p:txBody>
+      </p:sp>
+    </p:spTree>
+  </p:cSld>
+  <p:clrMapOvr>
+    <a:masterClrMapping/>
+  </p:clrMapOvr>
+</p:sld>
+</file>
+
+<file path=ppt/slides/slide22.xml><?xml version="1.0" encoding="utf-8"?>
+<p:sld xmlns:a="http://schemas.openxmlformats.org/drawingml/2006/main" xmlns:r="http://schemas.openxmlformats.org/officeDocument/2006/relationships" xmlns:p="http://schemas.openxmlformats.org/presentationml/2006/main">
+  <p:cSld>
+    <p:spTree>
+      <p:nvGrpSpPr>
+        <p:cNvPr id="1" name=""/>
+        <p:cNvGrpSpPr/>
+        <p:nvPr/>
+      </p:nvGrpSpPr>
+      <p:grpSpPr>
+        <a:xfrm>
+          <a:off x="0" y="0"/>
+          <a:ext cx="0" cy="0"/>
+          <a:chOff x="0" y="0"/>
+          <a:chExt cx="0" cy="0"/>
+        </a:xfrm>
+      </p:grpSpPr>
+      <p:pic>
+        <p:nvPicPr>
+          <p:cNvPr id="2" name="Picture 5"/>
+          <p:cNvPicPr>
+            <a:picLocks noChangeAspect="1" noChangeArrowheads="1"/>
+          </p:cNvPicPr>
+          <p:nvPr/>
+        </p:nvPicPr>
+        <p:blipFill>
+          <a:blip r:embed="rId2" cstate="print"/>
+          <a:srcRect/>
+          <a:stretch>
+            <a:fillRect/>
+          </a:stretch>
+        </p:blipFill>
+        <p:spPr bwMode="auto">
+          <a:xfrm>
+            <a:off x="431540" y="1484784"/>
+            <a:ext cx="3853991" cy="2070373"/>
+          </a:xfrm>
+          <a:prstGeom prst="rect">
+            <a:avLst/>
+          </a:prstGeom>
+          <a:noFill/>
+          <a:ln w="9525">
+            <a:noFill/>
+            <a:miter lim="800000"/>
+            <a:headEnd/>
+            <a:tailEnd/>
+          </a:ln>
+        </p:spPr>
+      </p:pic>
+      <p:sp>
+        <p:nvSpPr>
+          <p:cNvPr id="3" name="모서리가 둥근 직사각형 2"/>
+          <p:cNvSpPr/>
+          <p:nvPr/>
+        </p:nvSpPr>
+        <p:spPr>
+          <a:xfrm>
+            <a:off x="2231740" y="2240868"/>
+            <a:ext cx="720080" cy="144016"/>
+          </a:xfrm>
+          <a:prstGeom prst="roundRect">
+            <a:avLst/>
+          </a:prstGeom>
+          <a:noFill/>
+          <a:ln>
+            <a:solidFill>
+              <a:srgbClr val="FF0000"/>
+            </a:solidFill>
+          </a:ln>
+        </p:spPr>
+        <p:style>
+          <a:lnRef idx="2">
+            <a:schemeClr val="accent1">
+              <a:shade val="50000"/>
+            </a:schemeClr>
+          </a:lnRef>
+          <a:fillRef idx="1">
+            <a:schemeClr val="accent1"/>
+          </a:fillRef>
+          <a:effectRef idx="0">
+            <a:schemeClr val="accent1"/>
+          </a:effectRef>
+          <a:fontRef idx="minor">
+            <a:schemeClr val="lt1"/>
+          </a:fontRef>
+        </p:style>
+        <p:txBody>
+          <a:bodyPr rot="0" spcFirstLastPara="0" vertOverflow="overflow" horzOverflow="overflow" vert="horz" wrap="square" lIns="91440" tIns="45720" rIns="91440" bIns="45720" numCol="1" spcCol="0" rtlCol="0" fromWordArt="0" anchor="ctr" anchorCtr="0" forceAA="0" compatLnSpc="1">
+            <a:prstTxWarp prst="textNoShape">
+              <a:avLst/>
+            </a:prstTxWarp>
+            <a:noAutofit/>
+          </a:bodyPr>
+          <a:lstStyle/>
+          <a:p>
+            <a:pPr algn="ctr"/>
+            <a:endParaRPr lang="ko-KR" altLang="en-US"/>
+          </a:p>
+        </p:txBody>
+      </p:sp>
+      <p:sp>
+        <p:nvSpPr>
+          <p:cNvPr id="4" name="모서리가 둥근 직사각형 3"/>
+          <p:cNvSpPr/>
+          <p:nvPr/>
+        </p:nvSpPr>
+        <p:spPr>
+          <a:xfrm>
+            <a:off x="2375756" y="3392996"/>
+            <a:ext cx="720080" cy="144016"/>
+          </a:xfrm>
+          <a:prstGeom prst="roundRect">
+            <a:avLst/>
+          </a:prstGeom>
+          <a:noFill/>
+          <a:ln>
+            <a:solidFill>
+              <a:srgbClr val="FF0000"/>
+            </a:solidFill>
+          </a:ln>
+        </p:spPr>
+        <p:style>
+          <a:lnRef idx="2">
+            <a:schemeClr val="accent1">
+              <a:shade val="50000"/>
+            </a:schemeClr>
+          </a:lnRef>
+          <a:fillRef idx="1">
+            <a:schemeClr val="accent1"/>
+          </a:fillRef>
+          <a:effectRef idx="0">
+            <a:schemeClr val="accent1"/>
+          </a:effectRef>
+          <a:fontRef idx="minor">
+            <a:schemeClr val="lt1"/>
+          </a:fontRef>
+        </p:style>
+        <p:txBody>
+          <a:bodyPr rot="0" spcFirstLastPara="0" vertOverflow="overflow" horzOverflow="overflow" vert="horz" wrap="square" lIns="91440" tIns="45720" rIns="91440" bIns="45720" numCol="1" spcCol="0" rtlCol="0" fromWordArt="0" anchor="ctr" anchorCtr="0" forceAA="0" compatLnSpc="1">
+            <a:prstTxWarp prst="textNoShape">
+              <a:avLst/>
+            </a:prstTxWarp>
+            <a:noAutofit/>
+          </a:bodyPr>
+          <a:lstStyle/>
+          <a:p>
+            <a:pPr algn="ctr"/>
+            <a:endParaRPr lang="ko-KR" altLang="en-US"/>
+          </a:p>
+        </p:txBody>
+      </p:sp>
+      <p:sp>
+        <p:nvSpPr>
+          <p:cNvPr id="5" name="모서리가 둥근 직사각형 4"/>
+          <p:cNvSpPr/>
+          <p:nvPr/>
+        </p:nvSpPr>
+        <p:spPr>
+          <a:xfrm>
+            <a:off x="647564" y="2780928"/>
+            <a:ext cx="720080" cy="144016"/>
+          </a:xfrm>
+          <a:prstGeom prst="roundRect">
+            <a:avLst/>
+          </a:prstGeom>
+          <a:noFill/>
+          <a:ln>
+            <a:solidFill>
+              <a:srgbClr val="FF0000"/>
+            </a:solidFill>
+          </a:ln>
+        </p:spPr>
+        <p:style>
+          <a:lnRef idx="2">
+            <a:schemeClr val="accent1">
+              <a:shade val="50000"/>
+            </a:schemeClr>
+          </a:lnRef>
+          <a:fillRef idx="1">
+            <a:schemeClr val="accent1"/>
+          </a:fillRef>
+          <a:effectRef idx="0">
+            <a:schemeClr val="accent1"/>
+          </a:effectRef>
+          <a:fontRef idx="minor">
+            <a:schemeClr val="lt1"/>
+          </a:fontRef>
+        </p:style>
+        <p:txBody>
+          <a:bodyPr rot="0" spcFirstLastPara="0" vertOverflow="overflow" horzOverflow="overflow" vert="horz" wrap="square" lIns="91440" tIns="45720" rIns="91440" bIns="45720" numCol="1" spcCol="0" rtlCol="0" fromWordArt="0" anchor="ctr" anchorCtr="0" forceAA="0" compatLnSpc="1">
+            <a:prstTxWarp prst="textNoShape">
+              <a:avLst/>
+            </a:prstTxWarp>
+            <a:noAutofit/>
+          </a:bodyPr>
+          <a:lstStyle/>
+          <a:p>
+            <a:pPr algn="ctr"/>
+            <a:endParaRPr lang="ko-KR" altLang="en-US"/>
+          </a:p>
+        </p:txBody>
+      </p:sp>
+      <p:sp>
+        <p:nvSpPr>
+          <p:cNvPr id="6" name="TextBox 5"/>
+          <p:cNvSpPr txBox="1"/>
+          <p:nvPr/>
+        </p:nvSpPr>
+        <p:spPr>
+          <a:xfrm>
+            <a:off x="4499992" y="1448780"/>
+            <a:ext cx="4620176" cy="276999"/>
+          </a:xfrm>
+          <a:prstGeom prst="rect">
+            <a:avLst/>
+          </a:prstGeom>
+          <a:noFill/>
+        </p:spPr>
+        <p:txBody>
+          <a:bodyPr wrap="none" rtlCol="0">
+            <a:spAutoFit/>
+          </a:bodyPr>
+          <a:lstStyle/>
+          <a:p>
+            <a:r>
+              <a:rPr lang="en-US" altLang="ko-KR" sz="1200" dirty="0" smtClean="0">
+                <a:latin typeface="+mj-lt"/>
+              </a:rPr>
+              <a:t>1.</a:t>
+            </a:r>
+            <a:r>
+              <a:rPr lang="ko-KR" altLang="en-US" sz="1200" dirty="0" smtClean="0">
+                <a:latin typeface="+mj-lt"/>
+              </a:rPr>
+              <a:t> </a:t>
+            </a:r>
+            <a:r>
+              <a:rPr lang="en-US" altLang="ko-KR" sz="1200" dirty="0" smtClean="0">
+                <a:latin typeface="+mj-lt"/>
+              </a:rPr>
+              <a:t>No Function – ChangeScene – ChangeScenes()</a:t>
+            </a:r>
+            <a:r>
+              <a:rPr lang="ko-KR" altLang="en-US" sz="1200" dirty="0" smtClean="0">
+                <a:latin typeface="+mj-lt"/>
+              </a:rPr>
+              <a:t>를 클릭합니다</a:t>
+            </a:r>
+            <a:endParaRPr lang="ko-KR" altLang="en-US" sz="1200" dirty="0" smtClean="0">
+              <a:latin typeface="+mj-lt"/>
+            </a:endParaRPr>
+          </a:p>
+        </p:txBody>
+      </p:sp>
+    </p:spTree>
+  </p:cSld>
+  <p:clrMapOvr>
+    <a:masterClrMapping/>
+  </p:clrMapOvr>
+</p:sld>
+</file>
+
+<file path=ppt/slides/slide23.xml><?xml version="1.0" encoding="utf-8"?>
+<p:sld xmlns:a="http://schemas.openxmlformats.org/drawingml/2006/main" xmlns:r="http://schemas.openxmlformats.org/officeDocument/2006/relationships" xmlns:p="http://schemas.openxmlformats.org/presentationml/2006/main">
+  <p:cSld>
+    <p:spTree>
+      <p:nvGrpSpPr>
+        <p:cNvPr id="1" name=""/>
+        <p:cNvGrpSpPr/>
+        <p:nvPr/>
+      </p:nvGrpSpPr>
+      <p:grpSpPr>
+        <a:xfrm>
+          <a:off x="0" y="0"/>
+          <a:ext cx="0" cy="0"/>
+          <a:chOff x="0" y="0"/>
+          <a:chExt cx="0" cy="0"/>
+        </a:xfrm>
+      </p:grpSpPr>
+      <p:pic>
+        <p:nvPicPr>
+          <p:cNvPr id="6146" name="Picture 2"/>
+          <p:cNvPicPr>
+            <a:picLocks noChangeAspect="1" noChangeArrowheads="1"/>
+          </p:cNvPicPr>
+          <p:nvPr/>
+        </p:nvPicPr>
+        <p:blipFill>
+          <a:blip r:embed="rId2" cstate="print"/>
+          <a:srcRect/>
+          <a:stretch>
+            <a:fillRect/>
+          </a:stretch>
+        </p:blipFill>
+        <p:spPr bwMode="auto">
+          <a:xfrm>
+            <a:off x="395537" y="1160749"/>
+            <a:ext cx="2113004" cy="2376264"/>
+          </a:xfrm>
+          <a:prstGeom prst="rect">
+            <a:avLst/>
+          </a:prstGeom>
+          <a:noFill/>
+          <a:ln w="9525">
+            <a:noFill/>
+            <a:miter lim="800000"/>
+            <a:headEnd/>
+            <a:tailEnd/>
+          </a:ln>
+        </p:spPr>
+      </p:pic>
+      <p:pic>
+        <p:nvPicPr>
+          <p:cNvPr id="6147" name="Picture 3"/>
+          <p:cNvPicPr>
+            <a:picLocks noChangeAspect="1" noChangeArrowheads="1"/>
+          </p:cNvPicPr>
+          <p:nvPr/>
+        </p:nvPicPr>
+        <p:blipFill>
+          <a:blip r:embed="rId3" cstate="print"/>
+          <a:srcRect/>
+          <a:stretch>
+            <a:fillRect/>
+          </a:stretch>
+        </p:blipFill>
+        <p:spPr bwMode="auto">
+          <a:xfrm>
+            <a:off x="3530146" y="1160748"/>
+            <a:ext cx="4358651" cy="4225900"/>
+          </a:xfrm>
+          <a:prstGeom prst="rect">
+            <a:avLst/>
+          </a:prstGeom>
+          <a:noFill/>
+          <a:ln w="9525">
+            <a:noFill/>
+            <a:miter lim="800000"/>
+            <a:headEnd/>
+            <a:tailEnd/>
+          </a:ln>
+        </p:spPr>
+      </p:pic>
+      <p:sp>
+        <p:nvSpPr>
+          <p:cNvPr id="4" name="모서리가 둥근 직사각형 3"/>
+          <p:cNvSpPr/>
+          <p:nvPr/>
+        </p:nvSpPr>
+        <p:spPr>
+          <a:xfrm>
+            <a:off x="647564" y="2852936"/>
+            <a:ext cx="828092" cy="180020"/>
+          </a:xfrm>
+          <a:prstGeom prst="roundRect">
+            <a:avLst/>
+          </a:prstGeom>
+          <a:noFill/>
+          <a:ln>
+            <a:solidFill>
+              <a:srgbClr val="FF0000"/>
+            </a:solidFill>
+          </a:ln>
+        </p:spPr>
+        <p:style>
+          <a:lnRef idx="2">
+            <a:schemeClr val="accent1">
+              <a:shade val="50000"/>
+            </a:schemeClr>
+          </a:lnRef>
+          <a:fillRef idx="1">
+            <a:schemeClr val="accent1"/>
+          </a:fillRef>
+          <a:effectRef idx="0">
+            <a:schemeClr val="accent1"/>
+          </a:effectRef>
+          <a:fontRef idx="minor">
+            <a:schemeClr val="lt1"/>
+          </a:fontRef>
+        </p:style>
+        <p:txBody>
+          <a:bodyPr rot="0" spcFirstLastPara="0" vertOverflow="overflow" horzOverflow="overflow" vert="horz" wrap="square" lIns="91440" tIns="45720" rIns="91440" bIns="45720" numCol="1" spcCol="0" rtlCol="0" fromWordArt="0" anchor="ctr" anchorCtr="0" forceAA="0" compatLnSpc="1">
+            <a:prstTxWarp prst="textNoShape">
+              <a:avLst/>
+            </a:prstTxWarp>
+            <a:noAutofit/>
+          </a:bodyPr>
+          <a:lstStyle/>
+          <a:p>
+            <a:pPr algn="ctr"/>
+            <a:endParaRPr lang="ko-KR" altLang="en-US"/>
+          </a:p>
+        </p:txBody>
+      </p:sp>
+      <p:sp>
+        <p:nvSpPr>
+          <p:cNvPr id="5" name="모서리가 둥근 직사각형 4"/>
+          <p:cNvSpPr/>
+          <p:nvPr/>
+        </p:nvSpPr>
+        <p:spPr>
+          <a:xfrm>
+            <a:off x="3563888" y="1484784"/>
+            <a:ext cx="828092" cy="324036"/>
+          </a:xfrm>
+          <a:prstGeom prst="roundRect">
+            <a:avLst/>
+          </a:prstGeom>
+          <a:noFill/>
+          <a:ln>
+            <a:solidFill>
+              <a:srgbClr val="FF0000"/>
+            </a:solidFill>
+          </a:ln>
+        </p:spPr>
+        <p:style>
+          <a:lnRef idx="2">
+            <a:schemeClr val="accent1">
+              <a:shade val="50000"/>
+            </a:schemeClr>
+          </a:lnRef>
+          <a:fillRef idx="1">
+            <a:schemeClr val="accent1"/>
+          </a:fillRef>
+          <a:effectRef idx="0">
+            <a:schemeClr val="accent1"/>
+          </a:effectRef>
+          <a:fontRef idx="minor">
+            <a:schemeClr val="lt1"/>
+          </a:fontRef>
+        </p:style>
+        <p:txBody>
+          <a:bodyPr rot="0" spcFirstLastPara="0" vertOverflow="overflow" horzOverflow="overflow" vert="horz" wrap="square" lIns="91440" tIns="45720" rIns="91440" bIns="45720" numCol="1" spcCol="0" rtlCol="0" fromWordArt="0" anchor="ctr" anchorCtr="0" forceAA="0" compatLnSpc="1">
+            <a:prstTxWarp prst="textNoShape">
+              <a:avLst/>
+            </a:prstTxWarp>
+            <a:noAutofit/>
+          </a:bodyPr>
+          <a:lstStyle/>
+          <a:p>
+            <a:pPr algn="ctr"/>
+            <a:endParaRPr lang="ko-KR" altLang="en-US"/>
+          </a:p>
+        </p:txBody>
+      </p:sp>
+      <p:sp>
+        <p:nvSpPr>
+          <p:cNvPr id="6" name="TextBox 5"/>
+          <p:cNvSpPr txBox="1"/>
+          <p:nvPr/>
+        </p:nvSpPr>
+        <p:spPr>
+          <a:xfrm>
+            <a:off x="1691680" y="5661248"/>
+            <a:ext cx="5708101" cy="646331"/>
+          </a:xfrm>
+          <a:prstGeom prst="rect">
+            <a:avLst/>
+          </a:prstGeom>
+          <a:noFill/>
+        </p:spPr>
+        <p:txBody>
+          <a:bodyPr wrap="none" rtlCol="0">
+            <a:spAutoFit/>
+          </a:bodyPr>
+          <a:lstStyle/>
+          <a:p>
+            <a:pPr marL="228600" indent="-228600">
+              <a:buAutoNum type="arabicPeriod"/>
+            </a:pPr>
+            <a:r>
+              <a:rPr lang="en-US" altLang="ko-KR" sz="1200" dirty="0" smtClean="0">
+                <a:latin typeface="+mj-lt"/>
+              </a:rPr>
+              <a:t>File – Build Settings...</a:t>
+            </a:r>
+            <a:r>
+              <a:rPr lang="ko-KR" altLang="en-US" sz="1200" dirty="0" smtClean="0">
+                <a:latin typeface="+mj-lt"/>
+              </a:rPr>
+              <a:t>에서 </a:t>
+            </a:r>
+            <a:r>
+              <a:rPr lang="en-US" altLang="ko-KR" sz="1200" dirty="0" smtClean="0">
+                <a:latin typeface="+mj-lt"/>
+              </a:rPr>
+              <a:t>LodingScene</a:t>
+            </a:r>
+            <a:r>
+              <a:rPr lang="ko-KR" altLang="en-US" sz="1200" dirty="0" smtClean="0">
+                <a:latin typeface="+mj-lt"/>
+              </a:rPr>
+              <a:t>와 </a:t>
+            </a:r>
+            <a:r>
+              <a:rPr lang="en-US" altLang="ko-KR" sz="1200" dirty="0" smtClean="0">
+                <a:latin typeface="+mj-lt"/>
+              </a:rPr>
+              <a:t>Main</a:t>
+            </a:r>
+            <a:r>
+              <a:rPr lang="ko-KR" altLang="en-US" sz="1200" dirty="0" smtClean="0">
+                <a:latin typeface="+mj-lt"/>
+              </a:rPr>
+              <a:t>을 추가합니다</a:t>
+            </a:r>
+            <a:endParaRPr lang="en-US" altLang="ko-KR" sz="1200" dirty="0" smtClean="0">
+              <a:latin typeface="+mj-lt"/>
+            </a:endParaRPr>
+          </a:p>
+          <a:p>
+            <a:pPr marL="228600" indent="-228600">
+              <a:buAutoNum type="arabicPeriod"/>
+            </a:pPr>
+            <a:endParaRPr lang="en-US" altLang="ko-KR" sz="1200" dirty="0" smtClean="0">
+              <a:latin typeface="+mj-lt"/>
+            </a:endParaRPr>
+          </a:p>
+          <a:p>
+            <a:pPr marL="228600" indent="-228600">
+              <a:buAutoNum type="arabicPeriod"/>
+            </a:pPr>
+            <a:r>
+              <a:rPr lang="en-US" altLang="ko-KR" sz="1200" dirty="0" smtClean="0">
+                <a:latin typeface="+mj-lt"/>
+              </a:rPr>
+              <a:t>Play</a:t>
+            </a:r>
+            <a:r>
+              <a:rPr lang="ko-KR" altLang="en-US" sz="1200" dirty="0" smtClean="0">
+                <a:latin typeface="+mj-lt"/>
+              </a:rPr>
+              <a:t>버튼을 눌리고 </a:t>
+            </a:r>
+            <a:r>
+              <a:rPr lang="en-US" altLang="ko-KR" sz="1200" dirty="0" smtClean="0">
+                <a:latin typeface="+mj-lt"/>
+              </a:rPr>
+              <a:t>Start </a:t>
+            </a:r>
+            <a:r>
+              <a:rPr lang="ko-KR" altLang="en-US" sz="1200" dirty="0" smtClean="0">
+                <a:latin typeface="+mj-lt"/>
+              </a:rPr>
+              <a:t>버튼을 눌리면 </a:t>
+            </a:r>
+            <a:r>
+              <a:rPr lang="en-US" altLang="ko-KR" sz="1200" dirty="0" smtClean="0">
+                <a:latin typeface="+mj-lt"/>
+              </a:rPr>
+              <a:t>Main</a:t>
+            </a:r>
+            <a:r>
+              <a:rPr lang="ko-KR" altLang="en-US" sz="1200" dirty="0" smtClean="0">
+                <a:latin typeface="+mj-lt"/>
+              </a:rPr>
+              <a:t>으로 넘어가는걸 볼 수 있습니다</a:t>
+            </a:r>
+            <a:r>
+              <a:rPr lang="en-US" altLang="ko-KR" sz="1200" smtClean="0">
+                <a:latin typeface="+mj-lt"/>
+              </a:rPr>
+              <a:t>.</a:t>
+            </a:r>
+            <a:endParaRPr lang="ko-KR" altLang="en-US" sz="1200" dirty="0" smtClean="0">
+              <a:latin typeface="+mj-lt"/>
+            </a:endParaRPr>
+          </a:p>
+        </p:txBody>
+      </p:sp>
+    </p:spTree>
+  </p:cSld>
+  <p:clrMapOvr>
+    <a:masterClrMapping/>
+  </p:clrMapOvr>
+</p:sld>
+</file>
+
+<file path=ppt/slides/slide24.xml><?xml version="1.0" encoding="utf-8"?>
+<p:sld xmlns:a="http://schemas.openxmlformats.org/drawingml/2006/main" xmlns:r="http://schemas.openxmlformats.org/officeDocument/2006/relationships" xmlns:p="http://schemas.openxmlformats.org/presentationml/2006/main">
+  <p:cSld>
+    <p:spTree>
+      <p:nvGrpSpPr>
+        <p:cNvPr id="1" name=""/>
+        <p:cNvGrpSpPr/>
+        <p:nvPr/>
+      </p:nvGrpSpPr>
+      <p:grpSpPr>
+        <a:xfrm>
+          <a:off x="0" y="0"/>
+          <a:ext cx="0" cy="0"/>
+          <a:chOff x="0" y="0"/>
+          <a:chExt cx="0" cy="0"/>
+        </a:xfrm>
+      </p:grpSpPr>
+    </p:spTree>
+  </p:cSld>
+  <p:clrMapOvr>
+    <a:masterClrMapping/>
+  </p:clrMapOvr>
+</p:sld>
+</file>
+
+<file path=ppt/slides/slide25.xml><?xml version="1.0" encoding="utf-8"?>
+<p:sld xmlns:a="http://schemas.openxmlformats.org/drawingml/2006/main" xmlns:r="http://schemas.openxmlformats.org/officeDocument/2006/relationships" xmlns:p="http://schemas.openxmlformats.org/presentationml/2006/main">
+  <p:cSld>
+    <p:spTree>
+      <p:nvGrpSpPr>
+        <p:cNvPr id="1" name=""/>
+        <p:cNvGrpSpPr/>
+        <p:nvPr/>
+      </p:nvGrpSpPr>
+      <p:grpSpPr>
+        <a:xfrm>
+          <a:off x="0" y="0"/>
+          <a:ext cx="0" cy="0"/>
+          <a:chOff x="0" y="0"/>
+          <a:chExt cx="0" cy="0"/>
+        </a:xfrm>
+      </p:grpSpPr>
+    </p:spTree>
+  </p:cSld>
+  <p:clrMapOvr>
+    <a:masterClrMapping/>
+  </p:clrMapOvr>
+</p:sld>
+</file>
+
+<file path=ppt/slides/slide26.xml><?xml version="1.0" encoding="utf-8"?>
+<p:sld xmlns:a="http://schemas.openxmlformats.org/drawingml/2006/main" xmlns:r="http://schemas.openxmlformats.org/officeDocument/2006/relationships" xmlns:p="http://schemas.openxmlformats.org/presentationml/2006/main">
+  <p:cSld>
+    <p:spTree>
+      <p:nvGrpSpPr>
+        <p:cNvPr id="1" name=""/>
+        <p:cNvGrpSpPr/>
+        <p:nvPr/>
+      </p:nvGrpSpPr>
+      <p:grpSpPr>
+        <a:xfrm>
+          <a:off x="0" y="0"/>
+          <a:ext cx="0" cy="0"/>
+          <a:chOff x="0" y="0"/>
+          <a:chExt cx="0" cy="0"/>
+        </a:xfrm>
+      </p:grpSpPr>
+      <p:sp>
+        <p:nvSpPr>
+          <p:cNvPr id="4" name="TextBox 3"/>
+          <p:cNvSpPr txBox="1"/>
+          <p:nvPr/>
+        </p:nvSpPr>
+        <p:spPr>
+          <a:xfrm>
+            <a:off x="522831" y="-6392"/>
+            <a:ext cx="6992989" cy="807324"/>
+          </a:xfrm>
+          <a:prstGeom prst="rect">
+            <a:avLst/>
+          </a:prstGeom>
+          <a:noFill/>
+        </p:spPr>
+        <p:txBody>
+          <a:bodyPr wrap="none" rtlCol="0" anchor="ctr">
+            <a:noAutofit/>
+          </a:bodyPr>
+          <a:lstStyle/>
+          <a:p>
+            <a:r>
+              <a:rPr lang="en-US" altLang="ko-KR" sz="3400" b="1" dirty="0" smtClean="0">
+                <a:solidFill>
+                  <a:srgbClr val="1CCAB9"/>
+                </a:solidFill>
+                <a:latin typeface="+mn-ea"/>
+              </a:rPr>
+              <a:t>Reference</a:t>
+            </a:r>
+            <a:endParaRPr lang="en-US" altLang="ko-KR" sz="3400" b="1" dirty="0">
+              <a:solidFill>
+                <a:srgbClr val="1CCAB9"/>
+              </a:solidFill>
+              <a:latin typeface="+mn-ea"/>
+            </a:endParaRPr>
+          </a:p>
+        </p:txBody>
+      </p:sp>
+      <p:sp>
+        <p:nvSpPr>
+          <p:cNvPr id="5" name="Rectangle 8"/>
+          <p:cNvSpPr>
+            <a:spLocks noChangeArrowheads="1"/>
+          </p:cNvSpPr>
+          <p:nvPr/>
+        </p:nvSpPr>
+        <p:spPr bwMode="auto">
+          <a:xfrm>
+            <a:off x="643719" y="1021080"/>
+            <a:ext cx="7856562" cy="276999"/>
+          </a:xfrm>
+          <a:prstGeom prst="rect">
+            <a:avLst/>
+          </a:prstGeom>
+          <a:noFill/>
+          <a:ln w="9525">
+            <a:noFill/>
+            <a:miter lim="800000"/>
+            <a:headEnd/>
+            <a:tailEnd/>
+          </a:ln>
+        </p:spPr>
+        <p:txBody>
+          <a:bodyPr wrap="square">
+            <a:spAutoFit/>
+            <a:scene3d>
+              <a:camera prst="orthographicFront"/>
+              <a:lightRig rig="threePt" dir="t"/>
+            </a:scene3d>
+            <a:sp3d>
+              <a:bevelT w="1270" h="1270"/>
+            </a:sp3d>
+          </a:bodyPr>
+          <a:lstStyle/>
+          <a:p>
+            <a:pPr>
+              <a:spcBef>
+                <a:spcPts val="600"/>
+              </a:spcBef>
+              <a:defRPr/>
+            </a:pPr>
+            <a:r>
+              <a:rPr lang="en-US" altLang="ko-KR" sz="1200" b="1" dirty="0" smtClean="0">
+                <a:latin typeface="맑은 고딕" pitchFamily="50" charset="-127"/>
+                <a:ea typeface="맑은 고딕" pitchFamily="50" charset="-127"/>
+              </a:rPr>
+              <a:t>1</a:t>
+            </a:r>
+            <a:r>
+              <a:rPr lang="en-US" altLang="ko-KR" sz="1200" b="1" dirty="0">
+                <a:latin typeface="맑은 고딕" pitchFamily="50" charset="-127"/>
+              </a:rPr>
+              <a:t>. </a:t>
+            </a:r>
+            <a:r>
+              <a:rPr lang="en-US" altLang="ko-KR" sz="1200" b="1" dirty="0">
+                <a:latin typeface="맑은 고딕" pitchFamily="50" charset="-127"/>
+                <a:hlinkClick r:id="rId2"/>
+              </a:rPr>
+              <a:t>http://ptline.com/?</a:t>
+            </a:r>
+            <a:r>
+              <a:rPr lang="en-US" altLang="ko-KR" sz="1200" b="1" dirty="0" smtClean="0">
+                <a:latin typeface="맑은 고딕" pitchFamily="50" charset="-127"/>
+                <a:hlinkClick r:id="rId2"/>
+              </a:rPr>
+              <a:t>p=10346</a:t>
+            </a:r>
+            <a:r>
+              <a:rPr lang="en-US" altLang="ko-KR" sz="1200" b="1" dirty="0" smtClean="0">
+                <a:latin typeface="맑은 고딕" pitchFamily="50" charset="-127"/>
+              </a:rPr>
+              <a:t> (</a:t>
+            </a:r>
+            <a:r>
+              <a:rPr lang="ko-KR" altLang="en-US" sz="1200" b="1" dirty="0" smtClean="0">
+                <a:latin typeface="맑은 고딕" pitchFamily="50" charset="-127"/>
+              </a:rPr>
+              <a:t>무료 </a:t>
+            </a:r>
+            <a:r>
+              <a:rPr lang="en-US" altLang="ko-KR" sz="1200" b="1" dirty="0" smtClean="0">
+                <a:latin typeface="맑은 고딕" pitchFamily="50" charset="-127"/>
+              </a:rPr>
+              <a:t>PPT </a:t>
+            </a:r>
+            <a:r>
+              <a:rPr lang="ko-KR" altLang="en-US" sz="1200" b="1" dirty="0" smtClean="0">
+                <a:latin typeface="맑은 고딕" pitchFamily="50" charset="-127"/>
+              </a:rPr>
+              <a:t>템플릿 사이트</a:t>
+            </a:r>
+            <a:r>
+              <a:rPr lang="en-US" altLang="ko-KR" sz="1200" b="1" dirty="0" smtClean="0">
+                <a:latin typeface="맑은 고딕" pitchFamily="50" charset="-127"/>
+              </a:rPr>
+              <a:t>)</a:t>
+            </a:r>
+            <a:endParaRPr lang="en-US" altLang="ko-KR" sz="1100" b="1" dirty="0">
+              <a:latin typeface="맑은 고딕" pitchFamily="50" charset="-127"/>
+              <a:ea typeface="맑은 고딕" pitchFamily="50" charset="-127"/>
+            </a:endParaRPr>
+          </a:p>
+        </p:txBody>
+      </p:sp>
+    </p:spTree>
+    <p:extLst>
+      <p:ext uri="{BB962C8B-B14F-4D97-AF65-F5344CB8AC3E}">
+        <p14:creationId xmlns:p14="http://schemas.microsoft.com/office/powerpoint/2010/main" xmlns="" val="1257673598"/>
+      </p:ext>
+    </p:extLst>
+  </p:cSld>
+  <p:clrMapOvr>
+    <a:masterClrMapping/>
+  </p:clrMapOvr>
+  <mc:AlternateContent xmlns:mc="http://schemas.openxmlformats.org/markup-compatibility/2006">
+    <mc:Choice xmlns:p14="http://schemas.microsoft.com/office/powerpoint/2010/main" xmlns="" Requires="p14">
+      <p:transition spd="med" p14:dur="700">
+        <p:fade/>
+      </p:transition>
+    </mc:Choice>
+    <mc:Fallback>
+      <p:transition spd="med">
+        <p:fade/>
+      </p:transition>
+    </mc:Fallback>
+  </mc:AlternateContent>
+  <p:timing>
+    <p:tnLst>
+      <p:par>
+        <p:cTn id="1" dur="indefinite" restart="never" nodeType="tmRoot"/>
+      </p:par>
+    </p:tnLst>
+  </p:timing>
+</p:sld>
+</file>
+
+<file path=ppt/slides/slide27.xml><?xml version="1.0" encoding="utf-8"?>
+<p:sld xmlns:a="http://schemas.openxmlformats.org/drawingml/2006/main" xmlns:r="http://schemas.openxmlformats.org/officeDocument/2006/relationships" xmlns:p="http://schemas.openxmlformats.org/presentationml/2006/main">
+  <p:cSld>
+    <p:spTree>
+      <p:nvGrpSpPr>
+        <p:cNvPr id="1" name=""/>
+        <p:cNvGrpSpPr/>
+        <p:nvPr/>
+      </p:nvGrpSpPr>
+      <p:grpSpPr>
+        <a:xfrm>
+          <a:off x="0" y="0"/>
+          <a:ext cx="0" cy="0"/>
+          <a:chOff x="0" y="0"/>
+          <a:chExt cx="0" cy="0"/>
+        </a:xfrm>
+      </p:grpSpPr>
+      <p:sp>
+        <p:nvSpPr>
           <p:cNvPr id="5" name="TextBox 4"/>
           <p:cNvSpPr txBox="1"/>
           <p:nvPr/>
@@ -5809,20 +8085,20 @@
     </p:spTree>
     <p:extLst>
       <p:ext uri="{BB962C8B-B14F-4D97-AF65-F5344CB8AC3E}">
-        <p14:creationId xmlns:p14="http://schemas.microsoft.com/office/powerpoint/2010/main" val="191388031"/>
+        <p14:creationId xmlns:p14="http://schemas.microsoft.com/office/powerpoint/2010/main" xmlns="" val="191388031"/>
       </p:ext>
     </p:extLst>
   </p:cSld>
   <p:clrMapOvr>
     <a:masterClrMapping/>
   </p:clrMapOvr>
-  <mc:AlternateContent xmlns:mc="http://schemas.openxmlformats.org/markup-compatibility/2006" xmlns:p14="http://schemas.microsoft.com/office/powerpoint/2010/main">
-    <mc:Choice Requires="p14">
+  <mc:AlternateContent xmlns:mc="http://schemas.openxmlformats.org/markup-compatibility/2006">
+    <mc:Choice xmlns:p14="http://schemas.microsoft.com/office/powerpoint/2010/main" xmlns="" Requires="p14">
       <p:transition spd="med" p14:dur="700">
         <p:fade/>
       </p:transition>
     </mc:Choice>
-    <mc:Fallback xmlns="">
+    <mc:Fallback>
       <p:transition spd="med">
         <p:fade/>
       </p:transition>
@@ -5968,15 +8244,6 @@
               </a:rPr>
               <a:t>Ⅰ</a:t>
             </a:r>
-            <a:endParaRPr lang="en-US" altLang="ko-KR" sz="6600" spc="-50" dirty="0" smtClean="0">
-              <a:solidFill>
-                <a:schemeClr val="tx1">
-                  <a:lumMod val="50000"/>
-                  <a:lumOff val="50000"/>
-                </a:schemeClr>
-              </a:solidFill>
-              <a:latin typeface="+mn-ea"/>
-            </a:endParaRPr>
           </a:p>
         </p:txBody>
       </p:sp>
@@ -6363,20 +8630,20 @@
     </p:spTree>
     <p:extLst>
       <p:ext uri="{BB962C8B-B14F-4D97-AF65-F5344CB8AC3E}">
-        <p14:creationId xmlns:p14="http://schemas.microsoft.com/office/powerpoint/2010/main" val="3159791757"/>
+        <p14:creationId xmlns:p14="http://schemas.microsoft.com/office/powerpoint/2010/main" xmlns="" val="3159791757"/>
       </p:ext>
     </p:extLst>
   </p:cSld>
   <p:clrMapOvr>
     <a:masterClrMapping/>
   </p:clrMapOvr>
-  <mc:AlternateContent xmlns:mc="http://schemas.openxmlformats.org/markup-compatibility/2006" xmlns:p14="http://schemas.microsoft.com/office/powerpoint/2010/main">
-    <mc:Choice Requires="p14">
+  <mc:AlternateContent xmlns:mc="http://schemas.openxmlformats.org/markup-compatibility/2006">
+    <mc:Choice xmlns:p14="http://schemas.microsoft.com/office/powerpoint/2010/main" xmlns="" Requires="p14">
       <p:transition spd="med" p14:dur="700">
         <p:fade/>
       </p:transition>
     </mc:Choice>
-    <mc:Fallback xmlns="">
+    <mc:Fallback>
       <p:transition spd="med">
         <p:fade/>
       </p:transition>
@@ -6458,7 +8725,7 @@
           <p:nvPr/>
         </p:nvPicPr>
         <p:blipFill>
-          <a:blip r:embed="rId2"/>
+          <a:blip r:embed="rId2" cstate="print"/>
           <a:stretch>
             <a:fillRect/>
           </a:stretch>
@@ -6522,20 +8789,20 @@
     </p:spTree>
     <p:extLst>
       <p:ext uri="{BB962C8B-B14F-4D97-AF65-F5344CB8AC3E}">
-        <p14:creationId xmlns:p14="http://schemas.microsoft.com/office/powerpoint/2010/main" val="1995842376"/>
+        <p14:creationId xmlns:p14="http://schemas.microsoft.com/office/powerpoint/2010/main" xmlns="" val="1995842376"/>
       </p:ext>
     </p:extLst>
   </p:cSld>
   <p:clrMapOvr>
     <a:masterClrMapping/>
   </p:clrMapOvr>
-  <mc:AlternateContent xmlns:mc="http://schemas.openxmlformats.org/markup-compatibility/2006" xmlns:p14="http://schemas.microsoft.com/office/powerpoint/2010/main">
-    <mc:Choice Requires="p14">
+  <mc:AlternateContent xmlns:mc="http://schemas.openxmlformats.org/markup-compatibility/2006">
+    <mc:Choice xmlns:p14="http://schemas.microsoft.com/office/powerpoint/2010/main" xmlns="" Requires="p14">
       <p:transition spd="med" p14:dur="700">
         <p:fade/>
       </p:transition>
     </mc:Choice>
-    <mc:Fallback xmlns="">
+    <mc:Fallback>
       <p:transition spd="med">
         <p:fade/>
       </p:transition>
@@ -6617,7 +8884,7 @@
           <p:nvPr/>
         </p:nvPicPr>
         <p:blipFill>
-          <a:blip r:embed="rId2"/>
+          <a:blip r:embed="rId2" cstate="print"/>
           <a:stretch>
             <a:fillRect/>
           </a:stretch>
@@ -6935,20 +9202,20 @@
     </p:spTree>
     <p:extLst>
       <p:ext uri="{BB962C8B-B14F-4D97-AF65-F5344CB8AC3E}">
-        <p14:creationId xmlns:p14="http://schemas.microsoft.com/office/powerpoint/2010/main" val="1270215183"/>
+        <p14:creationId xmlns:p14="http://schemas.microsoft.com/office/powerpoint/2010/main" xmlns="" val="1270215183"/>
       </p:ext>
     </p:extLst>
   </p:cSld>
   <p:clrMapOvr>
     <a:masterClrMapping/>
   </p:clrMapOvr>
-  <mc:AlternateContent xmlns:mc="http://schemas.openxmlformats.org/markup-compatibility/2006" xmlns:p14="http://schemas.microsoft.com/office/powerpoint/2010/main">
-    <mc:Choice Requires="p14">
+  <mc:AlternateContent xmlns:mc="http://schemas.openxmlformats.org/markup-compatibility/2006">
+    <mc:Choice xmlns:p14="http://schemas.microsoft.com/office/powerpoint/2010/main" xmlns="" Requires="p14">
       <p:transition spd="med" p14:dur="700">
         <p:fade/>
       </p:transition>
     </mc:Choice>
-    <mc:Fallback xmlns="">
+    <mc:Fallback>
       <p:transition spd="med">
         <p:fade/>
       </p:transition>
@@ -7030,7 +9297,7 @@
           <p:nvPr/>
         </p:nvPicPr>
         <p:blipFill>
-          <a:blip r:embed="rId2"/>
+          <a:blip r:embed="rId2" cstate="print"/>
           <a:stretch>
             <a:fillRect/>
           </a:stretch>
@@ -7177,7 +9444,7 @@
           <p:nvPr/>
         </p:nvPicPr>
         <p:blipFill>
-          <a:blip r:embed="rId3"/>
+          <a:blip r:embed="rId3" cstate="print"/>
           <a:stretch>
             <a:fillRect/>
           </a:stretch>
@@ -7255,20 +9522,20 @@
     </p:spTree>
     <p:extLst>
       <p:ext uri="{BB962C8B-B14F-4D97-AF65-F5344CB8AC3E}">
-        <p14:creationId xmlns:p14="http://schemas.microsoft.com/office/powerpoint/2010/main" val="1824279279"/>
+        <p14:creationId xmlns:p14="http://schemas.microsoft.com/office/powerpoint/2010/main" xmlns="" val="1824279279"/>
       </p:ext>
     </p:extLst>
   </p:cSld>
   <p:clrMapOvr>
     <a:masterClrMapping/>
   </p:clrMapOvr>
-  <mc:AlternateContent xmlns:mc="http://schemas.openxmlformats.org/markup-compatibility/2006" xmlns:p14="http://schemas.microsoft.com/office/powerpoint/2010/main">
-    <mc:Choice Requires="p14">
+  <mc:AlternateContent xmlns:mc="http://schemas.openxmlformats.org/markup-compatibility/2006">
+    <mc:Choice xmlns:p14="http://schemas.microsoft.com/office/powerpoint/2010/main" xmlns="" Requires="p14">
       <p:transition spd="med" p14:dur="700">
         <p:fade/>
       </p:transition>
     </mc:Choice>
-    <mc:Fallback xmlns="">
+    <mc:Fallback>
       <p:transition spd="med">
         <p:fade/>
       </p:transition>
@@ -7449,7 +9716,7 @@
           <p:nvPr/>
         </p:nvPicPr>
         <p:blipFill>
-          <a:blip r:embed="rId2"/>
+          <a:blip r:embed="rId2" cstate="print"/>
           <a:stretch>
             <a:fillRect/>
           </a:stretch>
@@ -7702,7 +9969,7 @@
           <p:nvPr/>
         </p:nvPicPr>
         <p:blipFill>
-          <a:blip r:embed="rId3"/>
+          <a:blip r:embed="rId3" cstate="print"/>
           <a:stretch>
             <a:fillRect/>
           </a:stretch>
@@ -8024,20 +10291,20 @@
     </p:spTree>
     <p:extLst>
       <p:ext uri="{BB962C8B-B14F-4D97-AF65-F5344CB8AC3E}">
-        <p14:creationId xmlns:p14="http://schemas.microsoft.com/office/powerpoint/2010/main" val="3458515736"/>
+        <p14:creationId xmlns:p14="http://schemas.microsoft.com/office/powerpoint/2010/main" xmlns="" val="3458515736"/>
       </p:ext>
     </p:extLst>
   </p:cSld>
   <p:clrMapOvr>
     <a:masterClrMapping/>
   </p:clrMapOvr>
-  <mc:AlternateContent xmlns:mc="http://schemas.openxmlformats.org/markup-compatibility/2006" xmlns:p14="http://schemas.microsoft.com/office/powerpoint/2010/main">
-    <mc:Choice Requires="p14">
+  <mc:AlternateContent xmlns:mc="http://schemas.openxmlformats.org/markup-compatibility/2006">
+    <mc:Choice xmlns:p14="http://schemas.microsoft.com/office/powerpoint/2010/main" xmlns="" Requires="p14">
       <p:transition spd="med" p14:dur="700">
         <p:fade/>
       </p:transition>
     </mc:Choice>
-    <mc:Fallback xmlns="">
+    <mc:Fallback>
       <p:transition spd="med">
         <p:fade/>
       </p:transition>
@@ -8119,7 +10386,7 @@
           <p:nvPr/>
         </p:nvPicPr>
         <p:blipFill>
-          <a:blip r:embed="rId2"/>
+          <a:blip r:embed="rId2" cstate="print"/>
           <a:stretch>
             <a:fillRect/>
           </a:stretch>
@@ -8240,7 +10507,7 @@
           <p:nvPr/>
         </p:nvPicPr>
         <p:blipFill>
-          <a:blip r:embed="rId3"/>
+          <a:blip r:embed="rId3" cstate="print"/>
           <a:stretch>
             <a:fillRect/>
           </a:stretch>
@@ -8384,7 +10651,7 @@
           <p:nvPr/>
         </p:nvPicPr>
         <p:blipFill>
-          <a:blip r:embed="rId4"/>
+          <a:blip r:embed="rId4" cstate="print"/>
           <a:stretch>
             <a:fillRect/>
           </a:stretch>
@@ -8517,20 +10784,20 @@
     </p:spTree>
     <p:extLst>
       <p:ext uri="{BB962C8B-B14F-4D97-AF65-F5344CB8AC3E}">
-        <p14:creationId xmlns:p14="http://schemas.microsoft.com/office/powerpoint/2010/main" val="1790919670"/>
+        <p14:creationId xmlns:p14="http://schemas.microsoft.com/office/powerpoint/2010/main" xmlns="" val="1790919670"/>
       </p:ext>
     </p:extLst>
   </p:cSld>
   <p:clrMapOvr>
     <a:masterClrMapping/>
   </p:clrMapOvr>
-  <mc:AlternateContent xmlns:mc="http://schemas.openxmlformats.org/markup-compatibility/2006" xmlns:p14="http://schemas.microsoft.com/office/powerpoint/2010/main">
-    <mc:Choice Requires="p14">
+  <mc:AlternateContent xmlns:mc="http://schemas.openxmlformats.org/markup-compatibility/2006">
+    <mc:Choice xmlns:p14="http://schemas.microsoft.com/office/powerpoint/2010/main" xmlns="" Requires="p14">
       <p:transition spd="med" p14:dur="700">
         <p:fade/>
       </p:transition>
     </mc:Choice>
-    <mc:Fallback xmlns="">
+    <mc:Fallback>
       <p:transition spd="med">
         <p:fade/>
       </p:transition>
@@ -8612,7 +10879,7 @@
           <p:nvPr/>
         </p:nvPicPr>
         <p:blipFill>
-          <a:blip r:embed="rId2"/>
+          <a:blip r:embed="rId2" cstate="print"/>
           <a:stretch>
             <a:fillRect/>
           </a:stretch>
@@ -8685,7 +10952,7 @@
           <p:nvPr/>
         </p:nvPicPr>
         <p:blipFill>
-          <a:blip r:embed="rId3"/>
+          <a:blip r:embed="rId3" cstate="print"/>
           <a:stretch>
             <a:fillRect/>
           </a:stretch>
@@ -8790,7 +11057,7 @@
           <p:nvPr/>
         </p:nvPicPr>
         <p:blipFill>
-          <a:blip r:embed="rId4"/>
+          <a:blip r:embed="rId4" cstate="print"/>
           <a:stretch>
             <a:fillRect/>
           </a:stretch>
@@ -9025,20 +11292,20 @@
     </p:spTree>
     <p:extLst>
       <p:ext uri="{BB962C8B-B14F-4D97-AF65-F5344CB8AC3E}">
-        <p14:creationId xmlns:p14="http://schemas.microsoft.com/office/powerpoint/2010/main" val="1794295054"/>
+        <p14:creationId xmlns:p14="http://schemas.microsoft.com/office/powerpoint/2010/main" xmlns="" val="1794295054"/>
       </p:ext>
     </p:extLst>
   </p:cSld>
   <p:clrMapOvr>
     <a:masterClrMapping/>
   </p:clrMapOvr>
-  <mc:AlternateContent xmlns:mc="http://schemas.openxmlformats.org/markup-compatibility/2006" xmlns:p14="http://schemas.microsoft.com/office/powerpoint/2010/main">
-    <mc:Choice Requires="p14">
+  <mc:AlternateContent xmlns:mc="http://schemas.openxmlformats.org/markup-compatibility/2006">
+    <mc:Choice xmlns:p14="http://schemas.microsoft.com/office/powerpoint/2010/main" xmlns="" Requires="p14">
       <p:transition spd="med" p14:dur="700">
         <p:fade/>
       </p:transition>
     </mc:Choice>
-    <mc:Fallback xmlns="">
+    <mc:Fallback>
       <p:transition spd="med">
         <p:fade/>
       </p:transition>
@@ -9357,7 +11624,7 @@
   <a:extraClrSchemeLst/>
   <a:extLst>
     <a:ext uri="{05A4C25C-085E-4340-85A3-A5531E510DB2}">
-      <thm15:themeFamily xmlns:thm15="http://schemas.microsoft.com/office/thememl/2012/main" name="Office Theme" id="{62F939B6-93AF-4DB8-9C6B-D6C7DFDC589F}" vid="{4A3C46E8-61CC-4603-A589-7422A47A8E4A}"/>
+      <thm15:themeFamily xmlns:thm15="http://schemas.microsoft.com/office/thememl/2012/main" xmlns="" name="Office Theme" id="{62F939B6-93AF-4DB8-9C6B-D6C7DFDC589F}" vid="{4A3C46E8-61CC-4603-A589-7422A47A8E4A}"/>
     </a:ext>
   </a:extLst>
 </a:theme>
@@ -9406,7 +11673,7 @@
     </a:clrScheme>
     <a:fontScheme name="Office">
       <a:majorFont>
-        <a:latin typeface="맑은 고딕" panose="020F0302020204030204"/>
+        <a:latin typeface="맑은 고딕"/>
         <a:ea typeface=""/>
         <a:cs typeface=""/>
         <a:font script="Jpan" typeface="游ゴシック Light"/>
@@ -9441,7 +11708,7 @@
         <a:font script="Geor" typeface="Sylfaen"/>
       </a:majorFont>
       <a:minorFont>
-        <a:latin typeface="맑은 고딕" panose="020F0502020204030204"/>
+        <a:latin typeface="맑은 고딕"/>
         <a:ea typeface=""/>
         <a:cs typeface=""/>
         <a:font script="Jpan" typeface="游ゴシック"/>
@@ -9618,7 +11885,7 @@
   <a:extraClrSchemeLst/>
   <a:extLst>
     <a:ext uri="{05A4C25C-085E-4340-85A3-A5531E510DB2}">
-      <thm15:themeFamily xmlns:thm15="http://schemas.microsoft.com/office/thememl/2012/main" name="Office Theme" id="{62F939B6-93AF-4DB8-9C6B-D6C7DFDC589F}" vid="{4A3C46E8-61CC-4603-A589-7422A47A8E4A}"/>
+      <thm15:themeFamily xmlns:thm15="http://schemas.microsoft.com/office/thememl/2012/main" xmlns="" name="Office Theme" id="{62F939B6-93AF-4DB8-9C6B-D6C7DFDC589F}" vid="{4A3C46E8-61CC-4603-A589-7422A47A8E4A}"/>
     </a:ext>
   </a:extLst>
 </a:theme>

</xml_diff>